<commit_message>
pptx generator worked well
</commit_message>
<xml_diff>
--- a/Notebooks/Nederlands/02 - Objecten datastructuren en operatoren/03 - Strings.pptx
+++ b/Notebooks/Nederlands/02 - Objecten datastructuren en operatoren/03 - Strings.pptx
@@ -263,6 +263,71 @@
     <p:sldId id="511" r:id="rId262"/>
     <p:sldId id="512" r:id="rId263"/>
     <p:sldId id="513" r:id="rId264"/>
+    <p:sldId id="514" r:id="rId265"/>
+    <p:sldId id="515" r:id="rId266"/>
+    <p:sldId id="516" r:id="rId267"/>
+    <p:sldId id="517" r:id="rId268"/>
+    <p:sldId id="518" r:id="rId269"/>
+    <p:sldId id="519" r:id="rId270"/>
+    <p:sldId id="520" r:id="rId271"/>
+    <p:sldId id="521" r:id="rId272"/>
+    <p:sldId id="522" r:id="rId273"/>
+    <p:sldId id="523" r:id="rId274"/>
+    <p:sldId id="524" r:id="rId275"/>
+    <p:sldId id="525" r:id="rId276"/>
+    <p:sldId id="526" r:id="rId277"/>
+    <p:sldId id="527" r:id="rId278"/>
+    <p:sldId id="528" r:id="rId279"/>
+    <p:sldId id="529" r:id="rId280"/>
+    <p:sldId id="530" r:id="rId281"/>
+    <p:sldId id="531" r:id="rId282"/>
+    <p:sldId id="532" r:id="rId283"/>
+    <p:sldId id="533" r:id="rId284"/>
+    <p:sldId id="534" r:id="rId285"/>
+    <p:sldId id="535" r:id="rId286"/>
+    <p:sldId id="536" r:id="rId287"/>
+    <p:sldId id="537" r:id="rId288"/>
+    <p:sldId id="538" r:id="rId289"/>
+    <p:sldId id="539" r:id="rId290"/>
+    <p:sldId id="540" r:id="rId291"/>
+    <p:sldId id="541" r:id="rId292"/>
+    <p:sldId id="542" r:id="rId293"/>
+    <p:sldId id="543" r:id="rId294"/>
+    <p:sldId id="544" r:id="rId295"/>
+    <p:sldId id="545" r:id="rId296"/>
+    <p:sldId id="546" r:id="rId297"/>
+    <p:sldId id="547" r:id="rId298"/>
+    <p:sldId id="548" r:id="rId299"/>
+    <p:sldId id="549" r:id="rId300"/>
+    <p:sldId id="550" r:id="rId301"/>
+    <p:sldId id="551" r:id="rId302"/>
+    <p:sldId id="552" r:id="rId303"/>
+    <p:sldId id="553" r:id="rId304"/>
+    <p:sldId id="554" r:id="rId305"/>
+    <p:sldId id="555" r:id="rId306"/>
+    <p:sldId id="556" r:id="rId307"/>
+    <p:sldId id="557" r:id="rId308"/>
+    <p:sldId id="558" r:id="rId309"/>
+    <p:sldId id="559" r:id="rId310"/>
+    <p:sldId id="560" r:id="rId311"/>
+    <p:sldId id="561" r:id="rId312"/>
+    <p:sldId id="562" r:id="rId313"/>
+    <p:sldId id="563" r:id="rId314"/>
+    <p:sldId id="564" r:id="rId315"/>
+    <p:sldId id="565" r:id="rId316"/>
+    <p:sldId id="566" r:id="rId317"/>
+    <p:sldId id="567" r:id="rId318"/>
+    <p:sldId id="568" r:id="rId319"/>
+    <p:sldId id="569" r:id="rId320"/>
+    <p:sldId id="570" r:id="rId321"/>
+    <p:sldId id="571" r:id="rId322"/>
+    <p:sldId id="572" r:id="rId323"/>
+    <p:sldId id="573" r:id="rId324"/>
+    <p:sldId id="574" r:id="rId325"/>
+    <p:sldId id="575" r:id="rId326"/>
+    <p:sldId id="576" r:id="rId327"/>
+    <p:sldId id="577" r:id="rId328"/>
+    <p:sldId id="578" r:id="rId329"/>
   </p:sldIdLst>
   <p:sldSz cx="9144000" cy="6858000" type="screen4x3"/>
   <p:notesSz cx="6858000" cy="9144000"/>
@@ -14541,6 +14606,24 @@
 </p:sld>
 </file>
 
+<file path=ppt/slides/slide259.xml><?xml version="1.0" encoding="utf-8"?>
+<p:sld xmlns:a="http://schemas.openxmlformats.org/drawingml/2006/main" xmlns:p="http://schemas.openxmlformats.org/presentationml/2006/main" xmlns:r="http://schemas.openxmlformats.org/officeDocument/2006/relationships">
+  <p:cSld>
+    <p:spTree>
+      <p:nvGrpSpPr>
+        <p:cNvPr id="1" name=""/>
+        <p:cNvGrpSpPr/>
+        <p:nvPr/>
+      </p:nvGrpSpPr>
+      <p:grpSpPr/>
+    </p:spTree>
+  </p:cSld>
+  <p:clrMapOvr>
+    <a:masterClrMapping/>
+  </p:clrMapOvr>
+</p:sld>
+</file>
+
 <file path=ppt/slides/slide26.xml><?xml version="1.0" encoding="utf-8"?>
 <p:sld xmlns:a="http://schemas.openxmlformats.org/drawingml/2006/main" xmlns:p="http://schemas.openxmlformats.org/presentationml/2006/main" xmlns:r="http://schemas.openxmlformats.org/officeDocument/2006/relationships">
   <p:cSld>
@@ -14607,6 +14690,628 @@
 </p:sld>
 </file>
 
+<file path=ppt/slides/slide260.xml><?xml version="1.0" encoding="utf-8"?>
+<p:sld xmlns:a="http://schemas.openxmlformats.org/drawingml/2006/main" xmlns:p="http://schemas.openxmlformats.org/presentationml/2006/main" xmlns:r="http://schemas.openxmlformats.org/officeDocument/2006/relationships">
+  <p:cSld>
+    <p:spTree>
+      <p:nvGrpSpPr>
+        <p:cNvPr id="1" name=""/>
+        <p:cNvGrpSpPr/>
+        <p:nvPr/>
+      </p:nvGrpSpPr>
+      <p:grpSpPr/>
+      <p:sp>
+        <p:nvSpPr>
+          <p:cNvPr id="2" name="TextBox 1"/>
+          <p:cNvSpPr txBox="1"/>
+          <p:nvPr/>
+        </p:nvSpPr>
+        <p:spPr>
+          <a:xfrm>
+            <a:off x="914400" y="914400"/>
+            <a:ext cx="914400" cy="914400"/>
+          </a:xfrm>
+          <a:prstGeom prst="rect">
+            <a:avLst/>
+          </a:prstGeom>
+          <a:noFill/>
+        </p:spPr>
+        <p:txBody>
+          <a:bodyPr wrap="none">
+            <a:spAutoFit/>
+          </a:bodyPr>
+          <a:lstStyle/>
+          <a:p>
+            <a:r>
+              <a:t>Info:</a:t>
+            </a:r>
+          </a:p>
+          <a:p>
+            <a:pPr>
+              <a:defRPr sz="1200"/>
+            </a:pPr>
+            <a:r>
+              <a:t>&lt;center&gt;</a:t>
+            </a:r>
+            <a:br/>
+            <a:r>
+              <a:t>    &lt;img src='https://intecbrussel.be/img/logo3.png' width='400px' height='auto'/&gt;</a:t>
+            </a:r>
+            <a:br/>
+            <a:r>
+              <a:t>    &lt;br/&gt;</a:t>
+            </a:r>
+            <a:br/>
+            <a:r>
+              <a:t>    &lt;em&gt;Python les-materialen&lt;/em&gt;</a:t>
+            </a:r>
+            <a:br/>
+            <a:r>
+              <a:t>&lt;/center&gt;</a:t>
+            </a:r>
+            <a:br/>
+          </a:p>
+        </p:txBody>
+      </p:sp>
+    </p:spTree>
+  </p:cSld>
+  <p:clrMapOvr>
+    <a:masterClrMapping/>
+  </p:clrMapOvr>
+</p:sld>
+</file>
+
+<file path=ppt/slides/slide261.xml><?xml version="1.0" encoding="utf-8"?>
+<p:sld xmlns:a="http://schemas.openxmlformats.org/drawingml/2006/main" xmlns:p="http://schemas.openxmlformats.org/presentationml/2006/main" xmlns:r="http://schemas.openxmlformats.org/officeDocument/2006/relationships">
+  <p:cSld>
+    <p:spTree>
+      <p:nvGrpSpPr>
+        <p:cNvPr id="1" name=""/>
+        <p:cNvGrpSpPr/>
+        <p:nvPr/>
+      </p:nvGrpSpPr>
+      <p:grpSpPr/>
+      <p:sp>
+        <p:nvSpPr>
+          <p:cNvPr id="2" name="TextBox 1"/>
+          <p:cNvSpPr txBox="1"/>
+          <p:nvPr/>
+        </p:nvSpPr>
+        <p:spPr>
+          <a:xfrm>
+            <a:off x="914400" y="914400"/>
+            <a:ext cx="914400" cy="914400"/>
+          </a:xfrm>
+          <a:prstGeom prst="rect">
+            <a:avLst/>
+          </a:prstGeom>
+          <a:noFill/>
+        </p:spPr>
+        <p:txBody>
+          <a:bodyPr wrap="none">
+            <a:spAutoFit/>
+          </a:bodyPr>
+          <a:lstStyle/>
+          <a:p>
+            <a:r>
+              <a:t>Info:</a:t>
+            </a:r>
+          </a:p>
+          <a:p>
+            <a:pPr>
+              <a:defRPr sz="1200"/>
+            </a:pPr>
+            <a:r>
+              <a:t># Strings</a:t>
+            </a:r>
+            <a:br/>
+          </a:p>
+        </p:txBody>
+      </p:sp>
+    </p:spTree>
+  </p:cSld>
+  <p:clrMapOvr>
+    <a:masterClrMapping/>
+  </p:clrMapOvr>
+</p:sld>
+</file>
+
+<file path=ppt/slides/slide262.xml><?xml version="1.0" encoding="utf-8"?>
+<p:sld xmlns:a="http://schemas.openxmlformats.org/drawingml/2006/main" xmlns:p="http://schemas.openxmlformats.org/presentationml/2006/main" xmlns:r="http://schemas.openxmlformats.org/officeDocument/2006/relationships">
+  <p:cSld>
+    <p:spTree>
+      <p:nvGrpSpPr>
+        <p:cNvPr id="1" name=""/>
+        <p:cNvGrpSpPr/>
+        <p:nvPr/>
+      </p:nvGrpSpPr>
+      <p:grpSpPr/>
+      <p:sp>
+        <p:nvSpPr>
+          <p:cNvPr id="2" name="TextBox 1"/>
+          <p:cNvSpPr txBox="1"/>
+          <p:nvPr/>
+        </p:nvSpPr>
+        <p:spPr>
+          <a:xfrm>
+            <a:off x="914400" y="914400"/>
+            <a:ext cx="914400" cy="914400"/>
+          </a:xfrm>
+          <a:prstGeom prst="rect">
+            <a:avLst/>
+          </a:prstGeom>
+          <a:noFill/>
+        </p:spPr>
+        <p:txBody>
+          <a:bodyPr wrap="none">
+            <a:spAutoFit/>
+          </a:bodyPr>
+          <a:lstStyle/>
+          <a:p>
+            <a:r>
+              <a:t>Info:</a:t>
+            </a:r>
+          </a:p>
+          <a:p>
+            <a:pPr>
+              <a:defRPr sz="1200"/>
+            </a:pPr>
+            <a:r>
+              <a:t>Strings worden in Python gebruikt om tekstinformatie, zoals namen, vast te leggen. Strings in Python zijn een *reeks (sequencies)*, wat betekent dat Python elk element in de string als een sequence bijhoudt. Python begrijpt bijvoorbeeld dat de tekenreeks "hallo" een reeks letters in een specifieke volgorde is. Dit betekent dat we indexering kunnen gebruiken om letters te pakken (zoals de eerste letter of de laatste letter).</a:t>
+            </a:r>
+            <a:br/>
+            <a:br/>
+            <a:r>
+              <a:t>Dit idee van een reeks is een belangrijk idee in Python en we zullen er later in de toekomst op terugkomen.</a:t>
+            </a:r>
+            <a:br/>
+            <a:br/>
+            <a:r>
+              <a:t>In deze lezing leren we over het volgende:</a:t>
+            </a:r>
+            <a:br/>
+            <a:br/>
+            <a:r>
+              <a:t>     1.) Strings maken</a:t>
+            </a:r>
+            <a:br/>
+            <a:r>
+              <a:t>     2.) Strings afdrukken</a:t>
+            </a:r>
+            <a:br/>
+            <a:r>
+              <a:t>     3.) Stringindexering en slicen</a:t>
+            </a:r>
+            <a:br/>
+            <a:r>
+              <a:t>     4.) Eigenschappen van String</a:t>
+            </a:r>
+            <a:br/>
+            <a:r>
+              <a:t>     5.) Stringmethoden</a:t>
+            </a:r>
+            <a:br/>
+            <a:r>
+              <a:t>     6.) Formatteren van String</a:t>
+            </a:r>
+            <a:br/>
+          </a:p>
+        </p:txBody>
+      </p:sp>
+    </p:spTree>
+  </p:cSld>
+  <p:clrMapOvr>
+    <a:masterClrMapping/>
+  </p:clrMapOvr>
+</p:sld>
+</file>
+
+<file path=ppt/slides/slide263.xml><?xml version="1.0" encoding="utf-8"?>
+<p:sld xmlns:a="http://schemas.openxmlformats.org/drawingml/2006/main" xmlns:p="http://schemas.openxmlformats.org/presentationml/2006/main" xmlns:r="http://schemas.openxmlformats.org/officeDocument/2006/relationships">
+  <p:cSld>
+    <p:spTree>
+      <p:nvGrpSpPr>
+        <p:cNvPr id="1" name=""/>
+        <p:cNvGrpSpPr/>
+        <p:nvPr/>
+      </p:nvGrpSpPr>
+      <p:grpSpPr/>
+      <p:sp>
+        <p:nvSpPr>
+          <p:cNvPr id="2" name="TextBox 1"/>
+          <p:cNvSpPr txBox="1"/>
+          <p:nvPr/>
+        </p:nvSpPr>
+        <p:spPr>
+          <a:xfrm>
+            <a:off x="914400" y="914400"/>
+            <a:ext cx="914400" cy="914400"/>
+          </a:xfrm>
+          <a:prstGeom prst="rect">
+            <a:avLst/>
+          </a:prstGeom>
+          <a:noFill/>
+        </p:spPr>
+        <p:txBody>
+          <a:bodyPr wrap="none">
+            <a:spAutoFit/>
+          </a:bodyPr>
+          <a:lstStyle/>
+          <a:p>
+            <a:r>
+              <a:t>Info:</a:t>
+            </a:r>
+          </a:p>
+          <a:p>
+            <a:pPr>
+              <a:defRPr sz="1200"/>
+            </a:pPr>
+            <a:r>
+              <a:t>## Een string maken</a:t>
+            </a:r>
+            <a:br/>
+            <a:br/>
+            <a:r>
+              <a:t>Om een string in Python te maken, moet je enkele aanhalingstekens (quote) of dubbele aanhalingstekens gebruiken. Bijvoorbeeld:</a:t>
+            </a:r>
+            <a:br/>
+          </a:p>
+        </p:txBody>
+      </p:sp>
+    </p:spTree>
+  </p:cSld>
+  <p:clrMapOvr>
+    <a:masterClrMapping/>
+  </p:clrMapOvr>
+</p:sld>
+</file>
+
+<file path=ppt/slides/slide264.xml><?xml version="1.0" encoding="utf-8"?>
+<p:sld xmlns:a="http://schemas.openxmlformats.org/drawingml/2006/main" xmlns:p="http://schemas.openxmlformats.org/presentationml/2006/main" xmlns:r="http://schemas.openxmlformats.org/officeDocument/2006/relationships">
+  <p:cSld>
+    <p:spTree>
+      <p:nvGrpSpPr>
+        <p:cNvPr id="1" name=""/>
+        <p:cNvGrpSpPr/>
+        <p:nvPr/>
+      </p:nvGrpSpPr>
+      <p:grpSpPr/>
+      <p:sp>
+        <p:nvSpPr>
+          <p:cNvPr id="2" name="TextBox 1"/>
+          <p:cNvSpPr txBox="1"/>
+          <p:nvPr/>
+        </p:nvSpPr>
+        <p:spPr>
+          <a:xfrm>
+            <a:off x="914400" y="914400"/>
+            <a:ext cx="914400" cy="914400"/>
+          </a:xfrm>
+          <a:prstGeom prst="rect">
+            <a:avLst/>
+          </a:prstGeom>
+          <a:noFill/>
+        </p:spPr>
+        <p:txBody>
+          <a:bodyPr wrap="none">
+            <a:spAutoFit/>
+          </a:bodyPr>
+          <a:lstStyle/>
+          <a:p>
+            <a:r>
+              <a:t>Python Code: </a:t>
+            </a:r>
+          </a:p>
+          <a:p>
+            <a:pPr>
+              <a:defRPr sz="1200"/>
+            </a:pPr>
+            <a:r>
+              <a:t>``` # Enkel woord</a:t>
+            </a:r>
+            <a:br/>
+            <a:r>
+              <a:t> `````` 'hello' ```</a:t>
+            </a:r>
+            <a:br/>
+          </a:p>
+        </p:txBody>
+      </p:sp>
+    </p:spTree>
+  </p:cSld>
+  <p:clrMapOvr>
+    <a:masterClrMapping/>
+  </p:clrMapOvr>
+</p:sld>
+</file>
+
+<file path=ppt/slides/slide265.xml><?xml version="1.0" encoding="utf-8"?>
+<p:sld xmlns:a="http://schemas.openxmlformats.org/drawingml/2006/main" xmlns:p="http://schemas.openxmlformats.org/presentationml/2006/main" xmlns:r="http://schemas.openxmlformats.org/officeDocument/2006/relationships">
+  <p:cSld>
+    <p:spTree>
+      <p:nvGrpSpPr>
+        <p:cNvPr id="1" name=""/>
+        <p:cNvGrpSpPr/>
+        <p:nvPr/>
+      </p:nvGrpSpPr>
+      <p:grpSpPr/>
+      <p:sp>
+        <p:nvSpPr>
+          <p:cNvPr id="2" name="TextBox 1"/>
+          <p:cNvSpPr txBox="1"/>
+          <p:nvPr/>
+        </p:nvSpPr>
+        <p:spPr>
+          <a:xfrm>
+            <a:off x="914400" y="914400"/>
+            <a:ext cx="914400" cy="914400"/>
+          </a:xfrm>
+          <a:prstGeom prst="rect">
+            <a:avLst/>
+          </a:prstGeom>
+          <a:noFill/>
+        </p:spPr>
+        <p:txBody>
+          <a:bodyPr wrap="none">
+            <a:spAutoFit/>
+          </a:bodyPr>
+          <a:lstStyle/>
+          <a:p>
+            <a:r>
+              <a:t>Python Code: </a:t>
+            </a:r>
+          </a:p>
+          <a:p>
+            <a:pPr>
+              <a:defRPr sz="1200"/>
+            </a:pPr>
+            <a:r>
+              <a:t>``` # Gehele zin </a:t>
+            </a:r>
+            <a:br/>
+            <a:r>
+              <a:t> `````` 'This is also a string' ```</a:t>
+            </a:r>
+            <a:br/>
+          </a:p>
+        </p:txBody>
+      </p:sp>
+    </p:spTree>
+  </p:cSld>
+  <p:clrMapOvr>
+    <a:masterClrMapping/>
+  </p:clrMapOvr>
+</p:sld>
+</file>
+
+<file path=ppt/slides/slide266.xml><?xml version="1.0" encoding="utf-8"?>
+<p:sld xmlns:a="http://schemas.openxmlformats.org/drawingml/2006/main" xmlns:p="http://schemas.openxmlformats.org/presentationml/2006/main" xmlns:r="http://schemas.openxmlformats.org/officeDocument/2006/relationships">
+  <p:cSld>
+    <p:spTree>
+      <p:nvGrpSpPr>
+        <p:cNvPr id="1" name=""/>
+        <p:cNvGrpSpPr/>
+        <p:nvPr/>
+      </p:nvGrpSpPr>
+      <p:grpSpPr/>
+      <p:sp>
+        <p:nvSpPr>
+          <p:cNvPr id="2" name="TextBox 1"/>
+          <p:cNvSpPr txBox="1"/>
+          <p:nvPr/>
+        </p:nvSpPr>
+        <p:spPr>
+          <a:xfrm>
+            <a:off x="914400" y="914400"/>
+            <a:ext cx="914400" cy="914400"/>
+          </a:xfrm>
+          <a:prstGeom prst="rect">
+            <a:avLst/>
+          </a:prstGeom>
+          <a:noFill/>
+        </p:spPr>
+        <p:txBody>
+          <a:bodyPr wrap="none">
+            <a:spAutoFit/>
+          </a:bodyPr>
+          <a:lstStyle/>
+          <a:p>
+            <a:r>
+              <a:t>Python Code: </a:t>
+            </a:r>
+          </a:p>
+          <a:p>
+            <a:pPr>
+              <a:defRPr sz="1200"/>
+            </a:pPr>
+            <a:r>
+              <a:t>``` # We kunnen ook dubbele aanhalingstekens (double quote) gebruiken</a:t>
+            </a:r>
+            <a:br/>
+            <a:r>
+              <a:t> `````` "String built with double quotes" ```</a:t>
+            </a:r>
+            <a:br/>
+          </a:p>
+        </p:txBody>
+      </p:sp>
+    </p:spTree>
+  </p:cSld>
+  <p:clrMapOvr>
+    <a:masterClrMapping/>
+  </p:clrMapOvr>
+</p:sld>
+</file>
+
+<file path=ppt/slides/slide267.xml><?xml version="1.0" encoding="utf-8"?>
+<p:sld xmlns:a="http://schemas.openxmlformats.org/drawingml/2006/main" xmlns:p="http://schemas.openxmlformats.org/presentationml/2006/main" xmlns:r="http://schemas.openxmlformats.org/officeDocument/2006/relationships">
+  <p:cSld>
+    <p:spTree>
+      <p:nvGrpSpPr>
+        <p:cNvPr id="1" name=""/>
+        <p:cNvGrpSpPr/>
+        <p:nvPr/>
+      </p:nvGrpSpPr>
+      <p:grpSpPr/>
+      <p:sp>
+        <p:nvSpPr>
+          <p:cNvPr id="2" name="TextBox 1"/>
+          <p:cNvSpPr txBox="1"/>
+          <p:nvPr/>
+        </p:nvSpPr>
+        <p:spPr>
+          <a:xfrm>
+            <a:off x="914400" y="914400"/>
+            <a:ext cx="914400" cy="914400"/>
+          </a:xfrm>
+          <a:prstGeom prst="rect">
+            <a:avLst/>
+          </a:prstGeom>
+          <a:noFill/>
+        </p:spPr>
+        <p:txBody>
+          <a:bodyPr wrap="none">
+            <a:spAutoFit/>
+          </a:bodyPr>
+          <a:lstStyle/>
+          <a:p>
+            <a:r>
+              <a:t>Python Code: </a:t>
+            </a:r>
+          </a:p>
+          <a:p>
+            <a:pPr>
+              <a:defRPr sz="1200"/>
+            </a:pPr>
+            <a:r>
+              <a:t>``` # Wees voorzichtig met aanhalingstekens (quotes)!</a:t>
+            </a:r>
+            <a:br/>
+            <a:r>
+              <a:t> `````` ' I'm using single quotes, but this will create an error' ```</a:t>
+            </a:r>
+            <a:br/>
+          </a:p>
+        </p:txBody>
+      </p:sp>
+    </p:spTree>
+  </p:cSld>
+  <p:clrMapOvr>
+    <a:masterClrMapping/>
+  </p:clrMapOvr>
+</p:sld>
+</file>
+
+<file path=ppt/slides/slide268.xml><?xml version="1.0" encoding="utf-8"?>
+<p:sld xmlns:a="http://schemas.openxmlformats.org/drawingml/2006/main" xmlns:p="http://schemas.openxmlformats.org/presentationml/2006/main" xmlns:r="http://schemas.openxmlformats.org/officeDocument/2006/relationships">
+  <p:cSld>
+    <p:spTree>
+      <p:nvGrpSpPr>
+        <p:cNvPr id="1" name=""/>
+        <p:cNvGrpSpPr/>
+        <p:nvPr/>
+      </p:nvGrpSpPr>
+      <p:grpSpPr/>
+      <p:sp>
+        <p:nvSpPr>
+          <p:cNvPr id="2" name="TextBox 1"/>
+          <p:cNvSpPr txBox="1"/>
+          <p:nvPr/>
+        </p:nvSpPr>
+        <p:spPr>
+          <a:xfrm>
+            <a:off x="914400" y="914400"/>
+            <a:ext cx="914400" cy="914400"/>
+          </a:xfrm>
+          <a:prstGeom prst="rect">
+            <a:avLst/>
+          </a:prstGeom>
+          <a:noFill/>
+        </p:spPr>
+        <p:txBody>
+          <a:bodyPr wrap="none">
+            <a:spAutoFit/>
+          </a:bodyPr>
+          <a:lstStyle/>
+          <a:p>
+            <a:r>
+              <a:t>Info:</a:t>
+            </a:r>
+          </a:p>
+          <a:p>
+            <a:pPr>
+              <a:defRPr sz="1200"/>
+            </a:pPr>
+            <a:r>
+              <a:t>De reden voor de bovenstaande fout is dat het enkele aanhalingsteken in &lt;code&gt;I'm&lt;/code&gt; de tekenreeks heeft gestopt. U kunt combinaties van dubbele en enkele aanhalingstekens gebruiken om de volledige verklaring te krijgen.</a:t>
+            </a:r>
+            <a:br/>
+          </a:p>
+        </p:txBody>
+      </p:sp>
+    </p:spTree>
+  </p:cSld>
+  <p:clrMapOvr>
+    <a:masterClrMapping/>
+  </p:clrMapOvr>
+</p:sld>
+</file>
+
+<file path=ppt/slides/slide269.xml><?xml version="1.0" encoding="utf-8"?>
+<p:sld xmlns:a="http://schemas.openxmlformats.org/drawingml/2006/main" xmlns:p="http://schemas.openxmlformats.org/presentationml/2006/main" xmlns:r="http://schemas.openxmlformats.org/officeDocument/2006/relationships">
+  <p:cSld>
+    <p:spTree>
+      <p:nvGrpSpPr>
+        <p:cNvPr id="1" name=""/>
+        <p:cNvGrpSpPr/>
+        <p:nvPr/>
+      </p:nvGrpSpPr>
+      <p:grpSpPr/>
+      <p:sp>
+        <p:nvSpPr>
+          <p:cNvPr id="2" name="TextBox 1"/>
+          <p:cNvSpPr txBox="1"/>
+          <p:nvPr/>
+        </p:nvSpPr>
+        <p:spPr>
+          <a:xfrm>
+            <a:off x="914400" y="914400"/>
+            <a:ext cx="914400" cy="914400"/>
+          </a:xfrm>
+          <a:prstGeom prst="rect">
+            <a:avLst/>
+          </a:prstGeom>
+          <a:noFill/>
+        </p:spPr>
+        <p:txBody>
+          <a:bodyPr wrap="none">
+            <a:spAutoFit/>
+          </a:bodyPr>
+          <a:lstStyle/>
+          <a:p>
+            <a:r>
+              <a:t>Python Code: </a:t>
+            </a:r>
+          </a:p>
+          <a:p>
+            <a:pPr>
+              <a:defRPr sz="1200"/>
+            </a:pPr>
+            <a:r>
+              <a:t>``` "Now I'm ready to use the single quotes inside a string!" ```</a:t>
+            </a:r>
+            <a:br/>
+          </a:p>
+        </p:txBody>
+      </p:sp>
+    </p:spTree>
+  </p:cSld>
+  <p:clrMapOvr>
+    <a:masterClrMapping/>
+  </p:clrMapOvr>
+</p:sld>
+</file>
+
 <file path=ppt/slides/slide27.xml><?xml version="1.0" encoding="utf-8"?>
 <p:sld xmlns:a="http://schemas.openxmlformats.org/drawingml/2006/main" xmlns:p="http://schemas.openxmlformats.org/presentationml/2006/main" xmlns:r="http://schemas.openxmlformats.org/officeDocument/2006/relationships">
   <p:cSld>
@@ -14668,6 +15373,589 @@
 </p:sld>
 </file>
 
+<file path=ppt/slides/slide270.xml><?xml version="1.0" encoding="utf-8"?>
+<p:sld xmlns:a="http://schemas.openxmlformats.org/drawingml/2006/main" xmlns:p="http://schemas.openxmlformats.org/presentationml/2006/main" xmlns:r="http://schemas.openxmlformats.org/officeDocument/2006/relationships">
+  <p:cSld>
+    <p:spTree>
+      <p:nvGrpSpPr>
+        <p:cNvPr id="1" name=""/>
+        <p:cNvGrpSpPr/>
+        <p:nvPr/>
+      </p:nvGrpSpPr>
+      <p:grpSpPr/>
+      <p:sp>
+        <p:nvSpPr>
+          <p:cNvPr id="2" name="TextBox 1"/>
+          <p:cNvSpPr txBox="1"/>
+          <p:nvPr/>
+        </p:nvSpPr>
+        <p:spPr>
+          <a:xfrm>
+            <a:off x="914400" y="914400"/>
+            <a:ext cx="914400" cy="914400"/>
+          </a:xfrm>
+          <a:prstGeom prst="rect">
+            <a:avLst/>
+          </a:prstGeom>
+          <a:noFill/>
+        </p:spPr>
+        <p:txBody>
+          <a:bodyPr wrap="none">
+            <a:spAutoFit/>
+          </a:bodyPr>
+          <a:lstStyle/>
+          <a:p>
+            <a:r>
+              <a:t>Info:</a:t>
+            </a:r>
+          </a:p>
+          <a:p>
+            <a:pPr>
+              <a:defRPr sz="1200"/>
+            </a:pPr>
+            <a:r>
+              <a:t>Laten we nu leren over het afdrukken van snaren!</a:t>
+            </a:r>
+            <a:br/>
+          </a:p>
+        </p:txBody>
+      </p:sp>
+    </p:spTree>
+  </p:cSld>
+  <p:clrMapOvr>
+    <a:masterClrMapping/>
+  </p:clrMapOvr>
+</p:sld>
+</file>
+
+<file path=ppt/slides/slide271.xml><?xml version="1.0" encoding="utf-8"?>
+<p:sld xmlns:a="http://schemas.openxmlformats.org/drawingml/2006/main" xmlns:p="http://schemas.openxmlformats.org/presentationml/2006/main" xmlns:r="http://schemas.openxmlformats.org/officeDocument/2006/relationships">
+  <p:cSld>
+    <p:spTree>
+      <p:nvGrpSpPr>
+        <p:cNvPr id="1" name=""/>
+        <p:cNvGrpSpPr/>
+        <p:nvPr/>
+      </p:nvGrpSpPr>
+      <p:grpSpPr/>
+      <p:sp>
+        <p:nvSpPr>
+          <p:cNvPr id="2" name="TextBox 1"/>
+          <p:cNvSpPr txBox="1"/>
+          <p:nvPr/>
+        </p:nvSpPr>
+        <p:spPr>
+          <a:xfrm>
+            <a:off x="914400" y="914400"/>
+            <a:ext cx="914400" cy="914400"/>
+          </a:xfrm>
+          <a:prstGeom prst="rect">
+            <a:avLst/>
+          </a:prstGeom>
+          <a:noFill/>
+        </p:spPr>
+        <p:txBody>
+          <a:bodyPr wrap="none">
+            <a:spAutoFit/>
+          </a:bodyPr>
+          <a:lstStyle/>
+          <a:p>
+            <a:r>
+              <a:t>Info:</a:t>
+            </a:r>
+          </a:p>
+          <a:p>
+            <a:pPr>
+              <a:defRPr sz="1200"/>
+            </a:pPr>
+            <a:r>
+              <a:t>## Een string afdrukken</a:t>
+            </a:r>
+            <a:br/>
+            <a:br/>
+            <a:r>
+              <a:t>Als u Jupyter-notebook gebruikt met alleen een tekenreeks in een cel, worden automatisch tekenreeksen uitgevoerd, maar de juiste manier om tekenreeksen in uw uitvoer weer te geven, is door een afdrukfunctie te gebruiken.</a:t>
+            </a:r>
+            <a:br/>
+          </a:p>
+        </p:txBody>
+      </p:sp>
+    </p:spTree>
+  </p:cSld>
+  <p:clrMapOvr>
+    <a:masterClrMapping/>
+  </p:clrMapOvr>
+</p:sld>
+</file>
+
+<file path=ppt/slides/slide272.xml><?xml version="1.0" encoding="utf-8"?>
+<p:sld xmlns:a="http://schemas.openxmlformats.org/drawingml/2006/main" xmlns:p="http://schemas.openxmlformats.org/presentationml/2006/main" xmlns:r="http://schemas.openxmlformats.org/officeDocument/2006/relationships">
+  <p:cSld>
+    <p:spTree>
+      <p:nvGrpSpPr>
+        <p:cNvPr id="1" name=""/>
+        <p:cNvGrpSpPr/>
+        <p:nvPr/>
+      </p:nvGrpSpPr>
+      <p:grpSpPr/>
+      <p:sp>
+        <p:nvSpPr>
+          <p:cNvPr id="2" name="TextBox 1"/>
+          <p:cNvSpPr txBox="1"/>
+          <p:nvPr/>
+        </p:nvSpPr>
+        <p:spPr>
+          <a:xfrm>
+            <a:off x="914400" y="914400"/>
+            <a:ext cx="914400" cy="914400"/>
+          </a:xfrm>
+          <a:prstGeom prst="rect">
+            <a:avLst/>
+          </a:prstGeom>
+          <a:noFill/>
+        </p:spPr>
+        <p:txBody>
+          <a:bodyPr wrap="none">
+            <a:spAutoFit/>
+          </a:bodyPr>
+          <a:lstStyle/>
+          <a:p>
+            <a:r>
+              <a:t>Python Code: </a:t>
+            </a:r>
+          </a:p>
+          <a:p>
+            <a:pPr>
+              <a:defRPr sz="1200"/>
+            </a:pPr>
+            <a:r>
+              <a:t>``` # We kunnen eenvoudig een string declareren</a:t>
+            </a:r>
+            <a:br/>
+            <a:r>
+              <a:t> `````` 'Hello World' ```</a:t>
+            </a:r>
+            <a:br/>
+          </a:p>
+        </p:txBody>
+      </p:sp>
+    </p:spTree>
+  </p:cSld>
+  <p:clrMapOvr>
+    <a:masterClrMapping/>
+  </p:clrMapOvr>
+</p:sld>
+</file>
+
+<file path=ppt/slides/slide273.xml><?xml version="1.0" encoding="utf-8"?>
+<p:sld xmlns:a="http://schemas.openxmlformats.org/drawingml/2006/main" xmlns:p="http://schemas.openxmlformats.org/presentationml/2006/main" xmlns:r="http://schemas.openxmlformats.org/officeDocument/2006/relationships">
+  <p:cSld>
+    <p:spTree>
+      <p:nvGrpSpPr>
+        <p:cNvPr id="1" name=""/>
+        <p:cNvGrpSpPr/>
+        <p:nvPr/>
+      </p:nvGrpSpPr>
+      <p:grpSpPr/>
+      <p:sp>
+        <p:nvSpPr>
+          <p:cNvPr id="2" name="TextBox 1"/>
+          <p:cNvSpPr txBox="1"/>
+          <p:nvPr/>
+        </p:nvSpPr>
+        <p:spPr>
+          <a:xfrm>
+            <a:off x="914400" y="914400"/>
+            <a:ext cx="914400" cy="914400"/>
+          </a:xfrm>
+          <a:prstGeom prst="rect">
+            <a:avLst/>
+          </a:prstGeom>
+          <a:noFill/>
+        </p:spPr>
+        <p:txBody>
+          <a:bodyPr wrap="none">
+            <a:spAutoFit/>
+          </a:bodyPr>
+          <a:lstStyle/>
+          <a:p>
+            <a:r>
+              <a:t>Python Code: </a:t>
+            </a:r>
+          </a:p>
+          <a:p>
+            <a:pPr>
+              <a:defRPr sz="1200"/>
+            </a:pPr>
+            <a:r>
+              <a:t>``` # Merk op dat we op deze manier niet meerdere strings kunnen uitvoeren</a:t>
+            </a:r>
+            <a:br/>
+            <a:r>
+              <a:t> `````` 'Hello World 1'</a:t>
+            </a:r>
+            <a:br/>
+            <a:r>
+              <a:t> `````` 'Hello World 2' ```</a:t>
+            </a:r>
+            <a:br/>
+          </a:p>
+        </p:txBody>
+      </p:sp>
+    </p:spTree>
+  </p:cSld>
+  <p:clrMapOvr>
+    <a:masterClrMapping/>
+  </p:clrMapOvr>
+</p:sld>
+</file>
+
+<file path=ppt/slides/slide274.xml><?xml version="1.0" encoding="utf-8"?>
+<p:sld xmlns:a="http://schemas.openxmlformats.org/drawingml/2006/main" xmlns:p="http://schemas.openxmlformats.org/presentationml/2006/main" xmlns:r="http://schemas.openxmlformats.org/officeDocument/2006/relationships">
+  <p:cSld>
+    <p:spTree>
+      <p:nvGrpSpPr>
+        <p:cNvPr id="1" name=""/>
+        <p:cNvGrpSpPr/>
+        <p:nvPr/>
+      </p:nvGrpSpPr>
+      <p:grpSpPr/>
+      <p:sp>
+        <p:nvSpPr>
+          <p:cNvPr id="2" name="TextBox 1"/>
+          <p:cNvSpPr txBox="1"/>
+          <p:nvPr/>
+        </p:nvSpPr>
+        <p:spPr>
+          <a:xfrm>
+            <a:off x="914400" y="914400"/>
+            <a:ext cx="914400" cy="914400"/>
+          </a:xfrm>
+          <a:prstGeom prst="rect">
+            <a:avLst/>
+          </a:prstGeom>
+          <a:noFill/>
+        </p:spPr>
+        <p:txBody>
+          <a:bodyPr wrap="none">
+            <a:spAutoFit/>
+          </a:bodyPr>
+          <a:lstStyle/>
+          <a:p>
+            <a:r>
+              <a:t>Info:</a:t>
+            </a:r>
+          </a:p>
+          <a:p>
+            <a:pPr>
+              <a:defRPr sz="1200"/>
+            </a:pPr>
+            <a:r>
+              <a:t>We kunnen een print statement gebruiken om een string af te drukken.</a:t>
+            </a:r>
+            <a:br/>
+          </a:p>
+        </p:txBody>
+      </p:sp>
+    </p:spTree>
+  </p:cSld>
+  <p:clrMapOvr>
+    <a:masterClrMapping/>
+  </p:clrMapOvr>
+</p:sld>
+</file>
+
+<file path=ppt/slides/slide275.xml><?xml version="1.0" encoding="utf-8"?>
+<p:sld xmlns:a="http://schemas.openxmlformats.org/drawingml/2006/main" xmlns:p="http://schemas.openxmlformats.org/presentationml/2006/main" xmlns:r="http://schemas.openxmlformats.org/officeDocument/2006/relationships">
+  <p:cSld>
+    <p:spTree>
+      <p:nvGrpSpPr>
+        <p:cNvPr id="1" name=""/>
+        <p:cNvGrpSpPr/>
+        <p:nvPr/>
+      </p:nvGrpSpPr>
+      <p:grpSpPr/>
+      <p:sp>
+        <p:nvSpPr>
+          <p:cNvPr id="2" name="TextBox 1"/>
+          <p:cNvSpPr txBox="1"/>
+          <p:nvPr/>
+        </p:nvSpPr>
+        <p:spPr>
+          <a:xfrm>
+            <a:off x="914400" y="914400"/>
+            <a:ext cx="914400" cy="914400"/>
+          </a:xfrm>
+          <a:prstGeom prst="rect">
+            <a:avLst/>
+          </a:prstGeom>
+          <a:noFill/>
+        </p:spPr>
+        <p:txBody>
+          <a:bodyPr wrap="none">
+            <a:spAutoFit/>
+          </a:bodyPr>
+          <a:lstStyle/>
+          <a:p>
+            <a:r>
+              <a:t>Python Code: </a:t>
+            </a:r>
+          </a:p>
+          <a:p>
+            <a:pPr>
+              <a:defRPr sz="1200"/>
+            </a:pPr>
+            <a:r>
+              <a:t>``` print('Hello World 1')</a:t>
+            </a:r>
+            <a:br/>
+            <a:r>
+              <a:t> `````` print('Hello World 2')</a:t>
+            </a:r>
+            <a:br/>
+            <a:r>
+              <a:t> `````` print('Use \n to print a new line')</a:t>
+            </a:r>
+            <a:br/>
+            <a:r>
+              <a:t> `````` print('\n')</a:t>
+            </a:r>
+            <a:br/>
+            <a:r>
+              <a:t> `````` print('See what I mean?') ```</a:t>
+            </a:r>
+            <a:br/>
+          </a:p>
+        </p:txBody>
+      </p:sp>
+    </p:spTree>
+  </p:cSld>
+  <p:clrMapOvr>
+    <a:masterClrMapping/>
+  </p:clrMapOvr>
+</p:sld>
+</file>
+
+<file path=ppt/slides/slide276.xml><?xml version="1.0" encoding="utf-8"?>
+<p:sld xmlns:a="http://schemas.openxmlformats.org/drawingml/2006/main" xmlns:p="http://schemas.openxmlformats.org/presentationml/2006/main" xmlns:r="http://schemas.openxmlformats.org/officeDocument/2006/relationships">
+  <p:cSld>
+    <p:spTree>
+      <p:nvGrpSpPr>
+        <p:cNvPr id="1" name=""/>
+        <p:cNvGrpSpPr/>
+        <p:nvPr/>
+      </p:nvGrpSpPr>
+      <p:grpSpPr/>
+      <p:sp>
+        <p:nvSpPr>
+          <p:cNvPr id="2" name="TextBox 1"/>
+          <p:cNvSpPr txBox="1"/>
+          <p:nvPr/>
+        </p:nvSpPr>
+        <p:spPr>
+          <a:xfrm>
+            <a:off x="914400" y="914400"/>
+            <a:ext cx="914400" cy="914400"/>
+          </a:xfrm>
+          <a:prstGeom prst="rect">
+            <a:avLst/>
+          </a:prstGeom>
+          <a:noFill/>
+        </p:spPr>
+        <p:txBody>
+          <a:bodyPr wrap="none">
+            <a:spAutoFit/>
+          </a:bodyPr>
+          <a:lstStyle/>
+          <a:p>
+            <a:r>
+              <a:t>Info:</a:t>
+            </a:r>
+          </a:p>
+          <a:p>
+            <a:pPr>
+              <a:defRPr sz="1200"/>
+            </a:pPr>
+            <a:r>
+              <a:t>## Basis van String</a:t>
+            </a:r>
+            <a:br/>
+          </a:p>
+        </p:txBody>
+      </p:sp>
+    </p:spTree>
+  </p:cSld>
+  <p:clrMapOvr>
+    <a:masterClrMapping/>
+  </p:clrMapOvr>
+</p:sld>
+</file>
+
+<file path=ppt/slides/slide277.xml><?xml version="1.0" encoding="utf-8"?>
+<p:sld xmlns:a="http://schemas.openxmlformats.org/drawingml/2006/main" xmlns:p="http://schemas.openxmlformats.org/presentationml/2006/main" xmlns:r="http://schemas.openxmlformats.org/officeDocument/2006/relationships">
+  <p:cSld>
+    <p:spTree>
+      <p:nvGrpSpPr>
+        <p:cNvPr id="1" name=""/>
+        <p:cNvGrpSpPr/>
+        <p:nvPr/>
+      </p:nvGrpSpPr>
+      <p:grpSpPr/>
+      <p:sp>
+        <p:nvSpPr>
+          <p:cNvPr id="2" name="TextBox 1"/>
+          <p:cNvSpPr txBox="1"/>
+          <p:nvPr/>
+        </p:nvSpPr>
+        <p:spPr>
+          <a:xfrm>
+            <a:off x="914400" y="914400"/>
+            <a:ext cx="914400" cy="914400"/>
+          </a:xfrm>
+          <a:prstGeom prst="rect">
+            <a:avLst/>
+          </a:prstGeom>
+          <a:noFill/>
+        </p:spPr>
+        <p:txBody>
+          <a:bodyPr wrap="none">
+            <a:spAutoFit/>
+          </a:bodyPr>
+          <a:lstStyle/>
+          <a:p>
+            <a:r>
+              <a:t>Info:</a:t>
+            </a:r>
+          </a:p>
+          <a:p>
+            <a:pPr>
+              <a:defRPr sz="1200"/>
+            </a:pPr>
+            <a:r>
+              <a:t>We kunnen ook een functie genoemd len() gebruiken  om de lengte van een string te controleren!</a:t>
+            </a:r>
+            <a:br/>
+          </a:p>
+        </p:txBody>
+      </p:sp>
+    </p:spTree>
+  </p:cSld>
+  <p:clrMapOvr>
+    <a:masterClrMapping/>
+  </p:clrMapOvr>
+</p:sld>
+</file>
+
+<file path=ppt/slides/slide278.xml><?xml version="1.0" encoding="utf-8"?>
+<p:sld xmlns:a="http://schemas.openxmlformats.org/drawingml/2006/main" xmlns:p="http://schemas.openxmlformats.org/presentationml/2006/main" xmlns:r="http://schemas.openxmlformats.org/officeDocument/2006/relationships">
+  <p:cSld>
+    <p:spTree>
+      <p:nvGrpSpPr>
+        <p:cNvPr id="1" name=""/>
+        <p:cNvGrpSpPr/>
+        <p:nvPr/>
+      </p:nvGrpSpPr>
+      <p:grpSpPr/>
+      <p:sp>
+        <p:nvSpPr>
+          <p:cNvPr id="2" name="TextBox 1"/>
+          <p:cNvSpPr txBox="1"/>
+          <p:nvPr/>
+        </p:nvSpPr>
+        <p:spPr>
+          <a:xfrm>
+            <a:off x="914400" y="914400"/>
+            <a:ext cx="914400" cy="914400"/>
+          </a:xfrm>
+          <a:prstGeom prst="rect">
+            <a:avLst/>
+          </a:prstGeom>
+          <a:noFill/>
+        </p:spPr>
+        <p:txBody>
+          <a:bodyPr wrap="none">
+            <a:spAutoFit/>
+          </a:bodyPr>
+          <a:lstStyle/>
+          <a:p>
+            <a:r>
+              <a:t>Python Code: </a:t>
+            </a:r>
+          </a:p>
+          <a:p>
+            <a:pPr>
+              <a:defRPr sz="1200"/>
+            </a:pPr>
+            <a:r>
+              <a:t>``` len('Hello World') ```</a:t>
+            </a:r>
+            <a:br/>
+          </a:p>
+        </p:txBody>
+      </p:sp>
+    </p:spTree>
+  </p:cSld>
+  <p:clrMapOvr>
+    <a:masterClrMapping/>
+  </p:clrMapOvr>
+</p:sld>
+</file>
+
+<file path=ppt/slides/slide279.xml><?xml version="1.0" encoding="utf-8"?>
+<p:sld xmlns:a="http://schemas.openxmlformats.org/drawingml/2006/main" xmlns:p="http://schemas.openxmlformats.org/presentationml/2006/main" xmlns:r="http://schemas.openxmlformats.org/officeDocument/2006/relationships">
+  <p:cSld>
+    <p:spTree>
+      <p:nvGrpSpPr>
+        <p:cNvPr id="1" name=""/>
+        <p:cNvGrpSpPr/>
+        <p:nvPr/>
+      </p:nvGrpSpPr>
+      <p:grpSpPr/>
+      <p:sp>
+        <p:nvSpPr>
+          <p:cNvPr id="2" name="TextBox 1"/>
+          <p:cNvSpPr txBox="1"/>
+          <p:nvPr/>
+        </p:nvSpPr>
+        <p:spPr>
+          <a:xfrm>
+            <a:off x="914400" y="914400"/>
+            <a:ext cx="914400" cy="914400"/>
+          </a:xfrm>
+          <a:prstGeom prst="rect">
+            <a:avLst/>
+          </a:prstGeom>
+          <a:noFill/>
+        </p:spPr>
+        <p:txBody>
+          <a:bodyPr wrap="none">
+            <a:spAutoFit/>
+          </a:bodyPr>
+          <a:lstStyle/>
+          <a:p>
+            <a:r>
+              <a:t>Info:</a:t>
+            </a:r>
+          </a:p>
+          <a:p>
+            <a:pPr>
+              <a:defRPr sz="1200"/>
+            </a:pPr>
+            <a:r>
+              <a:t>De ingebouwde len()-functie van Python telt alle tekens in de String, inclusief spaties en interpunctie (punctuation).</a:t>
+            </a:r>
+            <a:br/>
+          </a:p>
+        </p:txBody>
+      </p:sp>
+    </p:spTree>
+  </p:cSld>
+  <p:clrMapOvr>
+    <a:masterClrMapping/>
+  </p:clrMapOvr>
+</p:sld>
+</file>
+
 <file path=ppt/slides/slide28.xml><?xml version="1.0" encoding="utf-8"?>
 <p:sld xmlns:a="http://schemas.openxmlformats.org/drawingml/2006/main" xmlns:p="http://schemas.openxmlformats.org/presentationml/2006/main" xmlns:r="http://schemas.openxmlformats.org/officeDocument/2006/relationships">
   <p:cSld>
@@ -14729,6 +16017,586 @@
 </p:sld>
 </file>
 
+<file path=ppt/slides/slide280.xml><?xml version="1.0" encoding="utf-8"?>
+<p:sld xmlns:a="http://schemas.openxmlformats.org/drawingml/2006/main" xmlns:p="http://schemas.openxmlformats.org/presentationml/2006/main" xmlns:r="http://schemas.openxmlformats.org/officeDocument/2006/relationships">
+  <p:cSld>
+    <p:spTree>
+      <p:nvGrpSpPr>
+        <p:cNvPr id="1" name=""/>
+        <p:cNvGrpSpPr/>
+        <p:nvPr/>
+      </p:nvGrpSpPr>
+      <p:grpSpPr/>
+      <p:sp>
+        <p:nvSpPr>
+          <p:cNvPr id="2" name="TextBox 1"/>
+          <p:cNvSpPr txBox="1"/>
+          <p:nvPr/>
+        </p:nvSpPr>
+        <p:spPr>
+          <a:xfrm>
+            <a:off x="914400" y="914400"/>
+            <a:ext cx="914400" cy="914400"/>
+          </a:xfrm>
+          <a:prstGeom prst="rect">
+            <a:avLst/>
+          </a:prstGeom>
+          <a:noFill/>
+        </p:spPr>
+        <p:txBody>
+          <a:bodyPr wrap="none">
+            <a:spAutoFit/>
+          </a:bodyPr>
+          <a:lstStyle/>
+          <a:p>
+            <a:r>
+              <a:t>Info:</a:t>
+            </a:r>
+          </a:p>
+          <a:p>
+            <a:pPr>
+              <a:defRPr sz="1200"/>
+            </a:pPr>
+            <a:r>
+              <a:t>## Indexeren van String</a:t>
+            </a:r>
+            <a:br/>
+            <a:br/>
+            <a:r>
+              <a:t>We weten dat strings een sequences zijn, wat betekent dat Python indexen kan gebruiken om delen van de sequences aan te roepen. Laten we leren hoe dit werkt.</a:t>
+            </a:r>
+            <a:br/>
+            <a:br/>
+            <a:r>
+              <a:t>In Python gebruiken we vierkantehaakjes &lt;code&gt;[]&lt;/code&gt; na een object om zijn index aan te roepen. We moeten ook opmerken dat indexering begint bij 0 (zero) voor Python. Laten we een nieuw object maken met de naam &lt;code&gt;s&lt;/code&gt; en dan een paar voorbeelden van indexeren doornemen.</a:t>
+            </a:r>
+            <a:br/>
+          </a:p>
+        </p:txBody>
+      </p:sp>
+    </p:spTree>
+  </p:cSld>
+  <p:clrMapOvr>
+    <a:masterClrMapping/>
+  </p:clrMapOvr>
+</p:sld>
+</file>
+
+<file path=ppt/slides/slide281.xml><?xml version="1.0" encoding="utf-8"?>
+<p:sld xmlns:a="http://schemas.openxmlformats.org/drawingml/2006/main" xmlns:p="http://schemas.openxmlformats.org/presentationml/2006/main" xmlns:r="http://schemas.openxmlformats.org/officeDocument/2006/relationships">
+  <p:cSld>
+    <p:spTree>
+      <p:nvGrpSpPr>
+        <p:cNvPr id="1" name=""/>
+        <p:cNvGrpSpPr/>
+        <p:nvPr/>
+      </p:nvGrpSpPr>
+      <p:grpSpPr/>
+      <p:sp>
+        <p:nvSpPr>
+          <p:cNvPr id="2" name="TextBox 1"/>
+          <p:cNvSpPr txBox="1"/>
+          <p:nvPr/>
+        </p:nvSpPr>
+        <p:spPr>
+          <a:xfrm>
+            <a:off x="914400" y="914400"/>
+            <a:ext cx="914400" cy="914400"/>
+          </a:xfrm>
+          <a:prstGeom prst="rect">
+            <a:avLst/>
+          </a:prstGeom>
+          <a:noFill/>
+        </p:spPr>
+        <p:txBody>
+          <a:bodyPr wrap="none">
+            <a:spAutoFit/>
+          </a:bodyPr>
+          <a:lstStyle/>
+          <a:p>
+            <a:r>
+              <a:t>Python Code: </a:t>
+            </a:r>
+          </a:p>
+          <a:p>
+            <a:pPr>
+              <a:defRPr sz="1200"/>
+            </a:pPr>
+            <a:r>
+              <a:t>``` # Assign s as a string</a:t>
+            </a:r>
+            <a:br/>
+            <a:r>
+              <a:t> `````` s = 'Hello World' ```</a:t>
+            </a:r>
+            <a:br/>
+          </a:p>
+        </p:txBody>
+      </p:sp>
+    </p:spTree>
+  </p:cSld>
+  <p:clrMapOvr>
+    <a:masterClrMapping/>
+  </p:clrMapOvr>
+</p:sld>
+</file>
+
+<file path=ppt/slides/slide282.xml><?xml version="1.0" encoding="utf-8"?>
+<p:sld xmlns:a="http://schemas.openxmlformats.org/drawingml/2006/main" xmlns:p="http://schemas.openxmlformats.org/presentationml/2006/main" xmlns:r="http://schemas.openxmlformats.org/officeDocument/2006/relationships">
+  <p:cSld>
+    <p:spTree>
+      <p:nvGrpSpPr>
+        <p:cNvPr id="1" name=""/>
+        <p:cNvGrpSpPr/>
+        <p:nvPr/>
+      </p:nvGrpSpPr>
+      <p:grpSpPr/>
+      <p:sp>
+        <p:nvSpPr>
+          <p:cNvPr id="2" name="TextBox 1"/>
+          <p:cNvSpPr txBox="1"/>
+          <p:nvPr/>
+        </p:nvSpPr>
+        <p:spPr>
+          <a:xfrm>
+            <a:off x="914400" y="914400"/>
+            <a:ext cx="914400" cy="914400"/>
+          </a:xfrm>
+          <a:prstGeom prst="rect">
+            <a:avLst/>
+          </a:prstGeom>
+          <a:noFill/>
+        </p:spPr>
+        <p:txBody>
+          <a:bodyPr wrap="none">
+            <a:spAutoFit/>
+          </a:bodyPr>
+          <a:lstStyle/>
+          <a:p>
+            <a:r>
+              <a:t>Python Code: </a:t>
+            </a:r>
+          </a:p>
+          <a:p>
+            <a:pPr>
+              <a:defRPr sz="1200"/>
+            </a:pPr>
+            <a:r>
+              <a:t>``` #Check</a:t>
+            </a:r>
+            <a:br/>
+            <a:r>
+              <a:t> `````` s ```</a:t>
+            </a:r>
+            <a:br/>
+          </a:p>
+        </p:txBody>
+      </p:sp>
+    </p:spTree>
+  </p:cSld>
+  <p:clrMapOvr>
+    <a:masterClrMapping/>
+  </p:clrMapOvr>
+</p:sld>
+</file>
+
+<file path=ppt/slides/slide283.xml><?xml version="1.0" encoding="utf-8"?>
+<p:sld xmlns:a="http://schemas.openxmlformats.org/drawingml/2006/main" xmlns:p="http://schemas.openxmlformats.org/presentationml/2006/main" xmlns:r="http://schemas.openxmlformats.org/officeDocument/2006/relationships">
+  <p:cSld>
+    <p:spTree>
+      <p:nvGrpSpPr>
+        <p:cNvPr id="1" name=""/>
+        <p:cNvGrpSpPr/>
+        <p:nvPr/>
+      </p:nvGrpSpPr>
+      <p:grpSpPr/>
+      <p:sp>
+        <p:nvSpPr>
+          <p:cNvPr id="2" name="TextBox 1"/>
+          <p:cNvSpPr txBox="1"/>
+          <p:nvPr/>
+        </p:nvSpPr>
+        <p:spPr>
+          <a:xfrm>
+            <a:off x="914400" y="914400"/>
+            <a:ext cx="914400" cy="914400"/>
+          </a:xfrm>
+          <a:prstGeom prst="rect">
+            <a:avLst/>
+          </a:prstGeom>
+          <a:noFill/>
+        </p:spPr>
+        <p:txBody>
+          <a:bodyPr wrap="none">
+            <a:spAutoFit/>
+          </a:bodyPr>
+          <a:lstStyle/>
+          <a:p>
+            <a:r>
+              <a:t>Python Code: </a:t>
+            </a:r>
+          </a:p>
+          <a:p>
+            <a:pPr>
+              <a:defRPr sz="1200"/>
+            </a:pPr>
+            <a:r>
+              <a:t>``` # Print the object</a:t>
+            </a:r>
+            <a:br/>
+            <a:r>
+              <a:t> `````` print(s)  ```</a:t>
+            </a:r>
+            <a:br/>
+          </a:p>
+        </p:txBody>
+      </p:sp>
+    </p:spTree>
+  </p:cSld>
+  <p:clrMapOvr>
+    <a:masterClrMapping/>
+  </p:clrMapOvr>
+</p:sld>
+</file>
+
+<file path=ppt/slides/slide284.xml><?xml version="1.0" encoding="utf-8"?>
+<p:sld xmlns:a="http://schemas.openxmlformats.org/drawingml/2006/main" xmlns:p="http://schemas.openxmlformats.org/presentationml/2006/main" xmlns:r="http://schemas.openxmlformats.org/officeDocument/2006/relationships">
+  <p:cSld>
+    <p:spTree>
+      <p:nvGrpSpPr>
+        <p:cNvPr id="1" name=""/>
+        <p:cNvGrpSpPr/>
+        <p:nvPr/>
+      </p:nvGrpSpPr>
+      <p:grpSpPr/>
+      <p:sp>
+        <p:nvSpPr>
+          <p:cNvPr id="2" name="TextBox 1"/>
+          <p:cNvSpPr txBox="1"/>
+          <p:nvPr/>
+        </p:nvSpPr>
+        <p:spPr>
+          <a:xfrm>
+            <a:off x="914400" y="914400"/>
+            <a:ext cx="914400" cy="914400"/>
+          </a:xfrm>
+          <a:prstGeom prst="rect">
+            <a:avLst/>
+          </a:prstGeom>
+          <a:noFill/>
+        </p:spPr>
+        <p:txBody>
+          <a:bodyPr wrap="none">
+            <a:spAutoFit/>
+          </a:bodyPr>
+          <a:lstStyle/>
+          <a:p>
+            <a:r>
+              <a:t>Info:</a:t>
+            </a:r>
+          </a:p>
+          <a:p>
+            <a:pPr>
+              <a:defRPr sz="1200"/>
+            </a:pPr>
+            <a:r>
+              <a:t>Laten we beginnen met indexeren!</a:t>
+            </a:r>
+            <a:br/>
+          </a:p>
+        </p:txBody>
+      </p:sp>
+    </p:spTree>
+  </p:cSld>
+  <p:clrMapOvr>
+    <a:masterClrMapping/>
+  </p:clrMapOvr>
+</p:sld>
+</file>
+
+<file path=ppt/slides/slide285.xml><?xml version="1.0" encoding="utf-8"?>
+<p:sld xmlns:a="http://schemas.openxmlformats.org/drawingml/2006/main" xmlns:p="http://schemas.openxmlformats.org/presentationml/2006/main" xmlns:r="http://schemas.openxmlformats.org/officeDocument/2006/relationships">
+  <p:cSld>
+    <p:spTree>
+      <p:nvGrpSpPr>
+        <p:cNvPr id="1" name=""/>
+        <p:cNvGrpSpPr/>
+        <p:nvPr/>
+      </p:nvGrpSpPr>
+      <p:grpSpPr/>
+      <p:sp>
+        <p:nvSpPr>
+          <p:cNvPr id="2" name="TextBox 1"/>
+          <p:cNvSpPr txBox="1"/>
+          <p:nvPr/>
+        </p:nvSpPr>
+        <p:spPr>
+          <a:xfrm>
+            <a:off x="914400" y="914400"/>
+            <a:ext cx="914400" cy="914400"/>
+          </a:xfrm>
+          <a:prstGeom prst="rect">
+            <a:avLst/>
+          </a:prstGeom>
+          <a:noFill/>
+        </p:spPr>
+        <p:txBody>
+          <a:bodyPr wrap="none">
+            <a:spAutoFit/>
+          </a:bodyPr>
+          <a:lstStyle/>
+          <a:p>
+            <a:r>
+              <a:t>Python Code: </a:t>
+            </a:r>
+          </a:p>
+          <a:p>
+            <a:pPr>
+              <a:defRPr sz="1200"/>
+            </a:pPr>
+            <a:r>
+              <a:t>``` # Toon eerste element (in dit geval een letter)</a:t>
+            </a:r>
+            <a:br/>
+            <a:r>
+              <a:t> `````` s[0] ```</a:t>
+            </a:r>
+            <a:br/>
+          </a:p>
+        </p:txBody>
+      </p:sp>
+    </p:spTree>
+  </p:cSld>
+  <p:clrMapOvr>
+    <a:masterClrMapping/>
+  </p:clrMapOvr>
+</p:sld>
+</file>
+
+<file path=ppt/slides/slide286.xml><?xml version="1.0" encoding="utf-8"?>
+<p:sld xmlns:a="http://schemas.openxmlformats.org/drawingml/2006/main" xmlns:p="http://schemas.openxmlformats.org/presentationml/2006/main" xmlns:r="http://schemas.openxmlformats.org/officeDocument/2006/relationships">
+  <p:cSld>
+    <p:spTree>
+      <p:nvGrpSpPr>
+        <p:cNvPr id="1" name=""/>
+        <p:cNvGrpSpPr/>
+        <p:nvPr/>
+      </p:nvGrpSpPr>
+      <p:grpSpPr/>
+      <p:sp>
+        <p:nvSpPr>
+          <p:cNvPr id="2" name="TextBox 1"/>
+          <p:cNvSpPr txBox="1"/>
+          <p:nvPr/>
+        </p:nvSpPr>
+        <p:spPr>
+          <a:xfrm>
+            <a:off x="914400" y="914400"/>
+            <a:ext cx="914400" cy="914400"/>
+          </a:xfrm>
+          <a:prstGeom prst="rect">
+            <a:avLst/>
+          </a:prstGeom>
+          <a:noFill/>
+        </p:spPr>
+        <p:txBody>
+          <a:bodyPr wrap="none">
+            <a:spAutoFit/>
+          </a:bodyPr>
+          <a:lstStyle/>
+          <a:p>
+            <a:r>
+              <a:t>Python Code: </a:t>
+            </a:r>
+          </a:p>
+          <a:p>
+            <a:pPr>
+              <a:defRPr sz="1200"/>
+            </a:pPr>
+            <a:r>
+              <a:t>``` s[1] ```</a:t>
+            </a:r>
+            <a:br/>
+          </a:p>
+        </p:txBody>
+      </p:sp>
+    </p:spTree>
+  </p:cSld>
+  <p:clrMapOvr>
+    <a:masterClrMapping/>
+  </p:clrMapOvr>
+</p:sld>
+</file>
+
+<file path=ppt/slides/slide287.xml><?xml version="1.0" encoding="utf-8"?>
+<p:sld xmlns:a="http://schemas.openxmlformats.org/drawingml/2006/main" xmlns:p="http://schemas.openxmlformats.org/presentationml/2006/main" xmlns:r="http://schemas.openxmlformats.org/officeDocument/2006/relationships">
+  <p:cSld>
+    <p:spTree>
+      <p:nvGrpSpPr>
+        <p:cNvPr id="1" name=""/>
+        <p:cNvGrpSpPr/>
+        <p:nvPr/>
+      </p:nvGrpSpPr>
+      <p:grpSpPr/>
+      <p:sp>
+        <p:nvSpPr>
+          <p:cNvPr id="2" name="TextBox 1"/>
+          <p:cNvSpPr txBox="1"/>
+          <p:nvPr/>
+        </p:nvSpPr>
+        <p:spPr>
+          <a:xfrm>
+            <a:off x="914400" y="914400"/>
+            <a:ext cx="914400" cy="914400"/>
+          </a:xfrm>
+          <a:prstGeom prst="rect">
+            <a:avLst/>
+          </a:prstGeom>
+          <a:noFill/>
+        </p:spPr>
+        <p:txBody>
+          <a:bodyPr wrap="none">
+            <a:spAutoFit/>
+          </a:bodyPr>
+          <a:lstStyle/>
+          <a:p>
+            <a:r>
+              <a:t>Python Code: </a:t>
+            </a:r>
+          </a:p>
+          <a:p>
+            <a:pPr>
+              <a:defRPr sz="1200"/>
+            </a:pPr>
+            <a:r>
+              <a:t>``` s[2] ```</a:t>
+            </a:r>
+            <a:br/>
+          </a:p>
+        </p:txBody>
+      </p:sp>
+    </p:spTree>
+  </p:cSld>
+  <p:clrMapOvr>
+    <a:masterClrMapping/>
+  </p:clrMapOvr>
+</p:sld>
+</file>
+
+<file path=ppt/slides/slide288.xml><?xml version="1.0" encoding="utf-8"?>
+<p:sld xmlns:a="http://schemas.openxmlformats.org/drawingml/2006/main" xmlns:p="http://schemas.openxmlformats.org/presentationml/2006/main" xmlns:r="http://schemas.openxmlformats.org/officeDocument/2006/relationships">
+  <p:cSld>
+    <p:spTree>
+      <p:nvGrpSpPr>
+        <p:cNvPr id="1" name=""/>
+        <p:cNvGrpSpPr/>
+        <p:nvPr/>
+      </p:nvGrpSpPr>
+      <p:grpSpPr/>
+      <p:sp>
+        <p:nvSpPr>
+          <p:cNvPr id="2" name="TextBox 1"/>
+          <p:cNvSpPr txBox="1"/>
+          <p:nvPr/>
+        </p:nvSpPr>
+        <p:spPr>
+          <a:xfrm>
+            <a:off x="914400" y="914400"/>
+            <a:ext cx="914400" cy="914400"/>
+          </a:xfrm>
+          <a:prstGeom prst="rect">
+            <a:avLst/>
+          </a:prstGeom>
+          <a:noFill/>
+        </p:spPr>
+        <p:txBody>
+          <a:bodyPr wrap="none">
+            <a:spAutoFit/>
+          </a:bodyPr>
+          <a:lstStyle/>
+          <a:p>
+            <a:r>
+              <a:t>Info:</a:t>
+            </a:r>
+          </a:p>
+          <a:p>
+            <a:pPr>
+              <a:defRPr sz="1200"/>
+            </a:pPr>
+            <a:r>
+              <a:t>We kunnen een &lt;code&gt;:&lt;/code&gt; gebruiken om *slicing* uit te voeren die alles tot op een bepaald punt pakt. Bijvoorbeeld:</a:t>
+            </a:r>
+            <a:br/>
+          </a:p>
+        </p:txBody>
+      </p:sp>
+    </p:spTree>
+  </p:cSld>
+  <p:clrMapOvr>
+    <a:masterClrMapping/>
+  </p:clrMapOvr>
+</p:sld>
+</file>
+
+<file path=ppt/slides/slide289.xml><?xml version="1.0" encoding="utf-8"?>
+<p:sld xmlns:a="http://schemas.openxmlformats.org/drawingml/2006/main" xmlns:p="http://schemas.openxmlformats.org/presentationml/2006/main" xmlns:r="http://schemas.openxmlformats.org/officeDocument/2006/relationships">
+  <p:cSld>
+    <p:spTree>
+      <p:nvGrpSpPr>
+        <p:cNvPr id="1" name=""/>
+        <p:cNvGrpSpPr/>
+        <p:nvPr/>
+      </p:nvGrpSpPr>
+      <p:grpSpPr/>
+      <p:sp>
+        <p:nvSpPr>
+          <p:cNvPr id="2" name="TextBox 1"/>
+          <p:cNvSpPr txBox="1"/>
+          <p:nvPr/>
+        </p:nvSpPr>
+        <p:spPr>
+          <a:xfrm>
+            <a:off x="914400" y="914400"/>
+            <a:ext cx="914400" cy="914400"/>
+          </a:xfrm>
+          <a:prstGeom prst="rect">
+            <a:avLst/>
+          </a:prstGeom>
+          <a:noFill/>
+        </p:spPr>
+        <p:txBody>
+          <a:bodyPr wrap="none">
+            <a:spAutoFit/>
+          </a:bodyPr>
+          <a:lstStyle/>
+          <a:p>
+            <a:r>
+              <a:t>Python Code: </a:t>
+            </a:r>
+          </a:p>
+          <a:p>
+            <a:pPr>
+              <a:defRPr sz="1200"/>
+            </a:pPr>
+            <a:r>
+              <a:t>``` # Grijp alles voorbij de eerste term helemaal tot de lengte van s die len (en) is</a:t>
+            </a:r>
+            <a:br/>
+            <a:r>
+              <a:t> `````` s[1:] ```</a:t>
+            </a:r>
+            <a:br/>
+          </a:p>
+        </p:txBody>
+      </p:sp>
+    </p:spTree>
+  </p:cSld>
+  <p:clrMapOvr>
+    <a:masterClrMapping/>
+  </p:clrMapOvr>
+</p:sld>
+</file>
+
 <file path=ppt/slides/slide29.xml><?xml version="1.0" encoding="utf-8"?>
 <p:sld xmlns:a="http://schemas.openxmlformats.org/drawingml/2006/main" xmlns:p="http://schemas.openxmlformats.org/presentationml/2006/main" xmlns:r="http://schemas.openxmlformats.org/officeDocument/2006/relationships">
   <p:cSld>
@@ -14790,6 +16658,584 @@
 </p:sld>
 </file>
 
+<file path=ppt/slides/slide290.xml><?xml version="1.0" encoding="utf-8"?>
+<p:sld xmlns:a="http://schemas.openxmlformats.org/drawingml/2006/main" xmlns:p="http://schemas.openxmlformats.org/presentationml/2006/main" xmlns:r="http://schemas.openxmlformats.org/officeDocument/2006/relationships">
+  <p:cSld>
+    <p:spTree>
+      <p:nvGrpSpPr>
+        <p:cNvPr id="1" name=""/>
+        <p:cNvGrpSpPr/>
+        <p:nvPr/>
+      </p:nvGrpSpPr>
+      <p:grpSpPr/>
+      <p:sp>
+        <p:nvSpPr>
+          <p:cNvPr id="2" name="TextBox 1"/>
+          <p:cNvSpPr txBox="1"/>
+          <p:nvPr/>
+        </p:nvSpPr>
+        <p:spPr>
+          <a:xfrm>
+            <a:off x="914400" y="914400"/>
+            <a:ext cx="914400" cy="914400"/>
+          </a:xfrm>
+          <a:prstGeom prst="rect">
+            <a:avLst/>
+          </a:prstGeom>
+          <a:noFill/>
+        </p:spPr>
+        <p:txBody>
+          <a:bodyPr wrap="none">
+            <a:spAutoFit/>
+          </a:bodyPr>
+          <a:lstStyle/>
+          <a:p>
+            <a:r>
+              <a:t>Python Code: </a:t>
+            </a:r>
+          </a:p>
+          <a:p>
+            <a:pPr>
+              <a:defRPr sz="1200"/>
+            </a:pPr>
+            <a:r>
+              <a:t>``` # Merk op dat er geen verandering is in de originele s</a:t>
+            </a:r>
+            <a:br/>
+            <a:r>
+              <a:t> `````` s ```</a:t>
+            </a:r>
+            <a:br/>
+          </a:p>
+        </p:txBody>
+      </p:sp>
+    </p:spTree>
+  </p:cSld>
+  <p:clrMapOvr>
+    <a:masterClrMapping/>
+  </p:clrMapOvr>
+</p:sld>
+</file>
+
+<file path=ppt/slides/slide291.xml><?xml version="1.0" encoding="utf-8"?>
+<p:sld xmlns:a="http://schemas.openxmlformats.org/drawingml/2006/main" xmlns:p="http://schemas.openxmlformats.org/presentationml/2006/main" xmlns:r="http://schemas.openxmlformats.org/officeDocument/2006/relationships">
+  <p:cSld>
+    <p:spTree>
+      <p:nvGrpSpPr>
+        <p:cNvPr id="1" name=""/>
+        <p:cNvGrpSpPr/>
+        <p:nvPr/>
+      </p:nvGrpSpPr>
+      <p:grpSpPr/>
+      <p:sp>
+        <p:nvSpPr>
+          <p:cNvPr id="2" name="TextBox 1"/>
+          <p:cNvSpPr txBox="1"/>
+          <p:nvPr/>
+        </p:nvSpPr>
+        <p:spPr>
+          <a:xfrm>
+            <a:off x="914400" y="914400"/>
+            <a:ext cx="914400" cy="914400"/>
+          </a:xfrm>
+          <a:prstGeom prst="rect">
+            <a:avLst/>
+          </a:prstGeom>
+          <a:noFill/>
+        </p:spPr>
+        <p:txBody>
+          <a:bodyPr wrap="none">
+            <a:spAutoFit/>
+          </a:bodyPr>
+          <a:lstStyle/>
+          <a:p>
+            <a:r>
+              <a:t>Python Code: </a:t>
+            </a:r>
+          </a:p>
+          <a:p>
+            <a:pPr>
+              <a:defRPr sz="1200"/>
+            </a:pPr>
+            <a:r>
+              <a:t>``` # Grijp alles TOT de 3e index</a:t>
+            </a:r>
+            <a:br/>
+            <a:r>
+              <a:t> `````` s[:3] ```</a:t>
+            </a:r>
+            <a:br/>
+          </a:p>
+        </p:txBody>
+      </p:sp>
+    </p:spTree>
+  </p:cSld>
+  <p:clrMapOvr>
+    <a:masterClrMapping/>
+  </p:clrMapOvr>
+</p:sld>
+</file>
+
+<file path=ppt/slides/slide292.xml><?xml version="1.0" encoding="utf-8"?>
+<p:sld xmlns:a="http://schemas.openxmlformats.org/drawingml/2006/main" xmlns:p="http://schemas.openxmlformats.org/presentationml/2006/main" xmlns:r="http://schemas.openxmlformats.org/officeDocument/2006/relationships">
+  <p:cSld>
+    <p:spTree>
+      <p:nvGrpSpPr>
+        <p:cNvPr id="1" name=""/>
+        <p:cNvGrpSpPr/>
+        <p:nvPr/>
+      </p:nvGrpSpPr>
+      <p:grpSpPr/>
+      <p:sp>
+        <p:nvSpPr>
+          <p:cNvPr id="2" name="TextBox 1"/>
+          <p:cNvSpPr txBox="1"/>
+          <p:nvPr/>
+        </p:nvSpPr>
+        <p:spPr>
+          <a:xfrm>
+            <a:off x="914400" y="914400"/>
+            <a:ext cx="914400" cy="914400"/>
+          </a:xfrm>
+          <a:prstGeom prst="rect">
+            <a:avLst/>
+          </a:prstGeom>
+          <a:noFill/>
+        </p:spPr>
+        <p:txBody>
+          <a:bodyPr wrap="none">
+            <a:spAutoFit/>
+          </a:bodyPr>
+          <a:lstStyle/>
+          <a:p>
+            <a:r>
+              <a:t>Info:</a:t>
+            </a:r>
+          </a:p>
+          <a:p>
+            <a:pPr>
+              <a:defRPr sz="1200"/>
+            </a:pPr>
+            <a:r>
+              <a:t>Let op het bovenstaande slicen. Hier vertellen we Python om alles van 0 tot 3 te pakken. Het bevat niet de 3e index. Je zult dit veel merken in Python, waar statements en meestal in de context van "tot, maar niet inclusief" staan.</a:t>
+            </a:r>
+            <a:br/>
+          </a:p>
+        </p:txBody>
+      </p:sp>
+    </p:spTree>
+  </p:cSld>
+  <p:clrMapOvr>
+    <a:masterClrMapping/>
+  </p:clrMapOvr>
+</p:sld>
+</file>
+
+<file path=ppt/slides/slide293.xml><?xml version="1.0" encoding="utf-8"?>
+<p:sld xmlns:a="http://schemas.openxmlformats.org/drawingml/2006/main" xmlns:p="http://schemas.openxmlformats.org/presentationml/2006/main" xmlns:r="http://schemas.openxmlformats.org/officeDocument/2006/relationships">
+  <p:cSld>
+    <p:spTree>
+      <p:nvGrpSpPr>
+        <p:cNvPr id="1" name=""/>
+        <p:cNvGrpSpPr/>
+        <p:nvPr/>
+      </p:nvGrpSpPr>
+      <p:grpSpPr/>
+      <p:sp>
+        <p:nvSpPr>
+          <p:cNvPr id="2" name="TextBox 1"/>
+          <p:cNvSpPr txBox="1"/>
+          <p:nvPr/>
+        </p:nvSpPr>
+        <p:spPr>
+          <a:xfrm>
+            <a:off x="914400" y="914400"/>
+            <a:ext cx="914400" cy="914400"/>
+          </a:xfrm>
+          <a:prstGeom prst="rect">
+            <a:avLst/>
+          </a:prstGeom>
+          <a:noFill/>
+        </p:spPr>
+        <p:txBody>
+          <a:bodyPr wrap="none">
+            <a:spAutoFit/>
+          </a:bodyPr>
+          <a:lstStyle/>
+          <a:p>
+            <a:r>
+              <a:t>Python Code: </a:t>
+            </a:r>
+          </a:p>
+          <a:p>
+            <a:pPr>
+              <a:defRPr sz="1200"/>
+            </a:pPr>
+            <a:r>
+              <a:t>``` #Everything</a:t>
+            </a:r>
+            <a:br/>
+            <a:r>
+              <a:t> `````` s[:] ```</a:t>
+            </a:r>
+            <a:br/>
+          </a:p>
+        </p:txBody>
+      </p:sp>
+    </p:spTree>
+  </p:cSld>
+  <p:clrMapOvr>
+    <a:masterClrMapping/>
+  </p:clrMapOvr>
+</p:sld>
+</file>
+
+<file path=ppt/slides/slide294.xml><?xml version="1.0" encoding="utf-8"?>
+<p:sld xmlns:a="http://schemas.openxmlformats.org/drawingml/2006/main" xmlns:p="http://schemas.openxmlformats.org/presentationml/2006/main" xmlns:r="http://schemas.openxmlformats.org/officeDocument/2006/relationships">
+  <p:cSld>
+    <p:spTree>
+      <p:nvGrpSpPr>
+        <p:cNvPr id="1" name=""/>
+        <p:cNvGrpSpPr/>
+        <p:nvPr/>
+      </p:nvGrpSpPr>
+      <p:grpSpPr/>
+      <p:sp>
+        <p:nvSpPr>
+          <p:cNvPr id="2" name="TextBox 1"/>
+          <p:cNvSpPr txBox="1"/>
+          <p:nvPr/>
+        </p:nvSpPr>
+        <p:spPr>
+          <a:xfrm>
+            <a:off x="914400" y="914400"/>
+            <a:ext cx="914400" cy="914400"/>
+          </a:xfrm>
+          <a:prstGeom prst="rect">
+            <a:avLst/>
+          </a:prstGeom>
+          <a:noFill/>
+        </p:spPr>
+        <p:txBody>
+          <a:bodyPr wrap="none">
+            <a:spAutoFit/>
+          </a:bodyPr>
+          <a:lstStyle/>
+          <a:p>
+            <a:r>
+              <a:t>Info:</a:t>
+            </a:r>
+          </a:p>
+          <a:p>
+            <a:pPr>
+              <a:defRPr sz="1200"/>
+            </a:pPr>
+            <a:r>
+              <a:t>We kunnen ook negatieve indexering gebruiken om achteruit te gaan.</a:t>
+            </a:r>
+            <a:br/>
+          </a:p>
+        </p:txBody>
+      </p:sp>
+    </p:spTree>
+  </p:cSld>
+  <p:clrMapOvr>
+    <a:masterClrMapping/>
+  </p:clrMapOvr>
+</p:sld>
+</file>
+
+<file path=ppt/slides/slide295.xml><?xml version="1.0" encoding="utf-8"?>
+<p:sld xmlns:a="http://schemas.openxmlformats.org/drawingml/2006/main" xmlns:p="http://schemas.openxmlformats.org/presentationml/2006/main" xmlns:r="http://schemas.openxmlformats.org/officeDocument/2006/relationships">
+  <p:cSld>
+    <p:spTree>
+      <p:nvGrpSpPr>
+        <p:cNvPr id="1" name=""/>
+        <p:cNvGrpSpPr/>
+        <p:nvPr/>
+      </p:nvGrpSpPr>
+      <p:grpSpPr/>
+      <p:sp>
+        <p:nvSpPr>
+          <p:cNvPr id="2" name="TextBox 1"/>
+          <p:cNvSpPr txBox="1"/>
+          <p:nvPr/>
+        </p:nvSpPr>
+        <p:spPr>
+          <a:xfrm>
+            <a:off x="914400" y="914400"/>
+            <a:ext cx="914400" cy="914400"/>
+          </a:xfrm>
+          <a:prstGeom prst="rect">
+            <a:avLst/>
+          </a:prstGeom>
+          <a:noFill/>
+        </p:spPr>
+        <p:txBody>
+          <a:bodyPr wrap="none">
+            <a:spAutoFit/>
+          </a:bodyPr>
+          <a:lstStyle/>
+          <a:p>
+            <a:r>
+              <a:t>Python Code: </a:t>
+            </a:r>
+          </a:p>
+          <a:p>
+            <a:pPr>
+              <a:defRPr sz="1200"/>
+            </a:pPr>
+            <a:r>
+              <a:t>``` # Laatste letter (één index achter 0 zodat het terug rondloopt)</a:t>
+            </a:r>
+            <a:br/>
+            <a:r>
+              <a:t> `````` s[-1] ```</a:t>
+            </a:r>
+            <a:br/>
+          </a:p>
+        </p:txBody>
+      </p:sp>
+    </p:spTree>
+  </p:cSld>
+  <p:clrMapOvr>
+    <a:masterClrMapping/>
+  </p:clrMapOvr>
+</p:sld>
+</file>
+
+<file path=ppt/slides/slide296.xml><?xml version="1.0" encoding="utf-8"?>
+<p:sld xmlns:a="http://schemas.openxmlformats.org/drawingml/2006/main" xmlns:p="http://schemas.openxmlformats.org/presentationml/2006/main" xmlns:r="http://schemas.openxmlformats.org/officeDocument/2006/relationships">
+  <p:cSld>
+    <p:spTree>
+      <p:nvGrpSpPr>
+        <p:cNvPr id="1" name=""/>
+        <p:cNvGrpSpPr/>
+        <p:nvPr/>
+      </p:nvGrpSpPr>
+      <p:grpSpPr/>
+      <p:sp>
+        <p:nvSpPr>
+          <p:cNvPr id="2" name="TextBox 1"/>
+          <p:cNvSpPr txBox="1"/>
+          <p:nvPr/>
+        </p:nvSpPr>
+        <p:spPr>
+          <a:xfrm>
+            <a:off x="914400" y="914400"/>
+            <a:ext cx="914400" cy="914400"/>
+          </a:xfrm>
+          <a:prstGeom prst="rect">
+            <a:avLst/>
+          </a:prstGeom>
+          <a:noFill/>
+        </p:spPr>
+        <p:txBody>
+          <a:bodyPr wrap="none">
+            <a:spAutoFit/>
+          </a:bodyPr>
+          <a:lstStyle/>
+          <a:p>
+            <a:r>
+              <a:t>Python Code: </a:t>
+            </a:r>
+          </a:p>
+          <a:p>
+            <a:pPr>
+              <a:defRPr sz="1200"/>
+            </a:pPr>
+            <a:r>
+              <a:t>``` # Grijp alles behalve de laatste letter</a:t>
+            </a:r>
+            <a:br/>
+            <a:r>
+              <a:t> `````` s[:-1] ```</a:t>
+            </a:r>
+            <a:br/>
+          </a:p>
+        </p:txBody>
+      </p:sp>
+    </p:spTree>
+  </p:cSld>
+  <p:clrMapOvr>
+    <a:masterClrMapping/>
+  </p:clrMapOvr>
+</p:sld>
+</file>
+
+<file path=ppt/slides/slide297.xml><?xml version="1.0" encoding="utf-8"?>
+<p:sld xmlns:a="http://schemas.openxmlformats.org/drawingml/2006/main" xmlns:p="http://schemas.openxmlformats.org/presentationml/2006/main" xmlns:r="http://schemas.openxmlformats.org/officeDocument/2006/relationships">
+  <p:cSld>
+    <p:spTree>
+      <p:nvGrpSpPr>
+        <p:cNvPr id="1" name=""/>
+        <p:cNvGrpSpPr/>
+        <p:nvPr/>
+      </p:nvGrpSpPr>
+      <p:grpSpPr/>
+      <p:sp>
+        <p:nvSpPr>
+          <p:cNvPr id="2" name="TextBox 1"/>
+          <p:cNvSpPr txBox="1"/>
+          <p:nvPr/>
+        </p:nvSpPr>
+        <p:spPr>
+          <a:xfrm>
+            <a:off x="914400" y="914400"/>
+            <a:ext cx="914400" cy="914400"/>
+          </a:xfrm>
+          <a:prstGeom prst="rect">
+            <a:avLst/>
+          </a:prstGeom>
+          <a:noFill/>
+        </p:spPr>
+        <p:txBody>
+          <a:bodyPr wrap="none">
+            <a:spAutoFit/>
+          </a:bodyPr>
+          <a:lstStyle/>
+          <a:p>
+            <a:r>
+              <a:t>Info:</a:t>
+            </a:r>
+          </a:p>
+          <a:p>
+            <a:pPr>
+              <a:defRPr sz="1200"/>
+            </a:pPr>
+            <a:r>
+              <a:t>We kunnen ook index- en plaknotatie gebruiken om elementen van een reeks te pakken met een gespecificeerde stapgrootte (de standaardinstelling is 1). We kunnen bijvoorbeeld twee dubbele punten achter elkaar gebruiken en vervolgens een getal dat de frequentie aangeeft om elementen te pakken. Bijvoorbeeld:</a:t>
+            </a:r>
+            <a:br/>
+          </a:p>
+        </p:txBody>
+      </p:sp>
+    </p:spTree>
+  </p:cSld>
+  <p:clrMapOvr>
+    <a:masterClrMapping/>
+  </p:clrMapOvr>
+</p:sld>
+</file>
+
+<file path=ppt/slides/slide298.xml><?xml version="1.0" encoding="utf-8"?>
+<p:sld xmlns:a="http://schemas.openxmlformats.org/drawingml/2006/main" xmlns:p="http://schemas.openxmlformats.org/presentationml/2006/main" xmlns:r="http://schemas.openxmlformats.org/officeDocument/2006/relationships">
+  <p:cSld>
+    <p:spTree>
+      <p:nvGrpSpPr>
+        <p:cNvPr id="1" name=""/>
+        <p:cNvGrpSpPr/>
+        <p:nvPr/>
+      </p:nvGrpSpPr>
+      <p:grpSpPr/>
+      <p:sp>
+        <p:nvSpPr>
+          <p:cNvPr id="2" name="TextBox 1"/>
+          <p:cNvSpPr txBox="1"/>
+          <p:nvPr/>
+        </p:nvSpPr>
+        <p:spPr>
+          <a:xfrm>
+            <a:off x="914400" y="914400"/>
+            <a:ext cx="914400" cy="914400"/>
+          </a:xfrm>
+          <a:prstGeom prst="rect">
+            <a:avLst/>
+          </a:prstGeom>
+          <a:noFill/>
+        </p:spPr>
+        <p:txBody>
+          <a:bodyPr wrap="none">
+            <a:spAutoFit/>
+          </a:bodyPr>
+          <a:lstStyle/>
+          <a:p>
+            <a:r>
+              <a:t>Python Code: </a:t>
+            </a:r>
+          </a:p>
+          <a:p>
+            <a:pPr>
+              <a:defRPr sz="1200"/>
+            </a:pPr>
+            <a:r>
+              <a:t>``` # Grijp alles, maar lees in stappen van 1</a:t>
+            </a:r>
+            <a:br/>
+            <a:r>
+              <a:t> `````` s[::1] ```</a:t>
+            </a:r>
+            <a:br/>
+          </a:p>
+        </p:txBody>
+      </p:sp>
+    </p:spTree>
+  </p:cSld>
+  <p:clrMapOvr>
+    <a:masterClrMapping/>
+  </p:clrMapOvr>
+</p:sld>
+</file>
+
+<file path=ppt/slides/slide299.xml><?xml version="1.0" encoding="utf-8"?>
+<p:sld xmlns:a="http://schemas.openxmlformats.org/drawingml/2006/main" xmlns:p="http://schemas.openxmlformats.org/presentationml/2006/main" xmlns:r="http://schemas.openxmlformats.org/officeDocument/2006/relationships">
+  <p:cSld>
+    <p:spTree>
+      <p:nvGrpSpPr>
+        <p:cNvPr id="1" name=""/>
+        <p:cNvGrpSpPr/>
+        <p:nvPr/>
+      </p:nvGrpSpPr>
+      <p:grpSpPr/>
+      <p:sp>
+        <p:nvSpPr>
+          <p:cNvPr id="2" name="TextBox 1"/>
+          <p:cNvSpPr txBox="1"/>
+          <p:nvPr/>
+        </p:nvSpPr>
+        <p:spPr>
+          <a:xfrm>
+            <a:off x="914400" y="914400"/>
+            <a:ext cx="914400" cy="914400"/>
+          </a:xfrm>
+          <a:prstGeom prst="rect">
+            <a:avLst/>
+          </a:prstGeom>
+          <a:noFill/>
+        </p:spPr>
+        <p:txBody>
+          <a:bodyPr wrap="none">
+            <a:spAutoFit/>
+          </a:bodyPr>
+          <a:lstStyle/>
+          <a:p>
+            <a:r>
+              <a:t>Python Code: </a:t>
+            </a:r>
+          </a:p>
+          <a:p>
+            <a:pPr>
+              <a:defRPr sz="1200"/>
+            </a:pPr>
+            <a:r>
+              <a:t>``` # Grijp alles, maar lees in stapgroottes van 2</a:t>
+            </a:r>
+            <a:br/>
+            <a:r>
+              <a:t> `````` s[::2] ```</a:t>
+            </a:r>
+            <a:br/>
+          </a:p>
+        </p:txBody>
+      </p:sp>
+    </p:spTree>
+  </p:cSld>
+  <p:clrMapOvr>
+    <a:masterClrMapping/>
+  </p:clrMapOvr>
+</p:sld>
+</file>
+
 <file path=ppt/slides/slide3.xml><?xml version="1.0" encoding="utf-8"?>
 <p:sld xmlns:a="http://schemas.openxmlformats.org/drawingml/2006/main" xmlns:p="http://schemas.openxmlformats.org/presentationml/2006/main" xmlns:r="http://schemas.openxmlformats.org/officeDocument/2006/relationships">
   <p:cSld>
@@ -14960,6 +17406,582 @@
 </p:sld>
 </file>
 
+<file path=ppt/slides/slide300.xml><?xml version="1.0" encoding="utf-8"?>
+<p:sld xmlns:a="http://schemas.openxmlformats.org/drawingml/2006/main" xmlns:p="http://schemas.openxmlformats.org/presentationml/2006/main" xmlns:r="http://schemas.openxmlformats.org/officeDocument/2006/relationships">
+  <p:cSld>
+    <p:spTree>
+      <p:nvGrpSpPr>
+        <p:cNvPr id="1" name=""/>
+        <p:cNvGrpSpPr/>
+        <p:nvPr/>
+      </p:nvGrpSpPr>
+      <p:grpSpPr/>
+      <p:sp>
+        <p:nvSpPr>
+          <p:cNvPr id="2" name="TextBox 1"/>
+          <p:cNvSpPr txBox="1"/>
+          <p:nvPr/>
+        </p:nvSpPr>
+        <p:spPr>
+          <a:xfrm>
+            <a:off x="914400" y="914400"/>
+            <a:ext cx="914400" cy="914400"/>
+          </a:xfrm>
+          <a:prstGeom prst="rect">
+            <a:avLst/>
+          </a:prstGeom>
+          <a:noFill/>
+        </p:spPr>
+        <p:txBody>
+          <a:bodyPr wrap="none">
+            <a:spAutoFit/>
+          </a:bodyPr>
+          <a:lstStyle/>
+          <a:p>
+            <a:r>
+              <a:t>Python Code: </a:t>
+            </a:r>
+          </a:p>
+          <a:p>
+            <a:pPr>
+              <a:defRPr sz="1200"/>
+            </a:pPr>
+            <a:r>
+              <a:t>``` # We kunnen dit gebruiken om een string achterstevoren (backwards) af te drukken</a:t>
+            </a:r>
+            <a:br/>
+            <a:r>
+              <a:t> `````` s[::-1] ```</a:t>
+            </a:r>
+            <a:br/>
+          </a:p>
+        </p:txBody>
+      </p:sp>
+    </p:spTree>
+  </p:cSld>
+  <p:clrMapOvr>
+    <a:masterClrMapping/>
+  </p:clrMapOvr>
+</p:sld>
+</file>
+
+<file path=ppt/slides/slide301.xml><?xml version="1.0" encoding="utf-8"?>
+<p:sld xmlns:a="http://schemas.openxmlformats.org/drawingml/2006/main" xmlns:p="http://schemas.openxmlformats.org/presentationml/2006/main" xmlns:r="http://schemas.openxmlformats.org/officeDocument/2006/relationships">
+  <p:cSld>
+    <p:spTree>
+      <p:nvGrpSpPr>
+        <p:cNvPr id="1" name=""/>
+        <p:cNvGrpSpPr/>
+        <p:nvPr/>
+      </p:nvGrpSpPr>
+      <p:grpSpPr/>
+      <p:sp>
+        <p:nvSpPr>
+          <p:cNvPr id="2" name="TextBox 1"/>
+          <p:cNvSpPr txBox="1"/>
+          <p:nvPr/>
+        </p:nvSpPr>
+        <p:spPr>
+          <a:xfrm>
+            <a:off x="914400" y="914400"/>
+            <a:ext cx="914400" cy="914400"/>
+          </a:xfrm>
+          <a:prstGeom prst="rect">
+            <a:avLst/>
+          </a:prstGeom>
+          <a:noFill/>
+        </p:spPr>
+        <p:txBody>
+          <a:bodyPr wrap="none">
+            <a:spAutoFit/>
+          </a:bodyPr>
+          <a:lstStyle/>
+          <a:p>
+            <a:r>
+              <a:t>Info:</a:t>
+            </a:r>
+          </a:p>
+          <a:p>
+            <a:pPr>
+              <a:defRPr sz="1200"/>
+            </a:pPr>
+            <a:r>
+              <a:t>## Eigenschappen van String</a:t>
+            </a:r>
+            <a:br/>
+            <a:br/>
+            <a:r>
+              <a:t>Het is belangrijk op te merken dat strings een belangrijke eigenschap hebben die bekend staat als *onveranderlijkheid*. Dit betekent dat als een string eenmaal is gemaakt, de elementen erin niet meer kunnen worden gewijzigd of vervangen. Bijvoorbeeld:</a:t>
+            </a:r>
+            <a:br/>
+          </a:p>
+        </p:txBody>
+      </p:sp>
+    </p:spTree>
+  </p:cSld>
+  <p:clrMapOvr>
+    <a:masterClrMapping/>
+  </p:clrMapOvr>
+</p:sld>
+</file>
+
+<file path=ppt/slides/slide302.xml><?xml version="1.0" encoding="utf-8"?>
+<p:sld xmlns:a="http://schemas.openxmlformats.org/drawingml/2006/main" xmlns:p="http://schemas.openxmlformats.org/presentationml/2006/main" xmlns:r="http://schemas.openxmlformats.org/officeDocument/2006/relationships">
+  <p:cSld>
+    <p:spTree>
+      <p:nvGrpSpPr>
+        <p:cNvPr id="1" name=""/>
+        <p:cNvGrpSpPr/>
+        <p:nvPr/>
+      </p:nvGrpSpPr>
+      <p:grpSpPr/>
+      <p:sp>
+        <p:nvSpPr>
+          <p:cNvPr id="2" name="TextBox 1"/>
+          <p:cNvSpPr txBox="1"/>
+          <p:nvPr/>
+        </p:nvSpPr>
+        <p:spPr>
+          <a:xfrm>
+            <a:off x="914400" y="914400"/>
+            <a:ext cx="914400" cy="914400"/>
+          </a:xfrm>
+          <a:prstGeom prst="rect">
+            <a:avLst/>
+          </a:prstGeom>
+          <a:noFill/>
+        </p:spPr>
+        <p:txBody>
+          <a:bodyPr wrap="none">
+            <a:spAutoFit/>
+          </a:bodyPr>
+          <a:lstStyle/>
+          <a:p>
+            <a:r>
+              <a:t>Python Code: </a:t>
+            </a:r>
+          </a:p>
+          <a:p>
+            <a:pPr>
+              <a:defRPr sz="1200"/>
+            </a:pPr>
+            <a:r>
+              <a:t>``` s ```</a:t>
+            </a:r>
+            <a:br/>
+          </a:p>
+        </p:txBody>
+      </p:sp>
+    </p:spTree>
+  </p:cSld>
+  <p:clrMapOvr>
+    <a:masterClrMapping/>
+  </p:clrMapOvr>
+</p:sld>
+</file>
+
+<file path=ppt/slides/slide303.xml><?xml version="1.0" encoding="utf-8"?>
+<p:sld xmlns:a="http://schemas.openxmlformats.org/drawingml/2006/main" xmlns:p="http://schemas.openxmlformats.org/presentationml/2006/main" xmlns:r="http://schemas.openxmlformats.org/officeDocument/2006/relationships">
+  <p:cSld>
+    <p:spTree>
+      <p:nvGrpSpPr>
+        <p:cNvPr id="1" name=""/>
+        <p:cNvGrpSpPr/>
+        <p:nvPr/>
+      </p:nvGrpSpPr>
+      <p:grpSpPr/>
+      <p:sp>
+        <p:nvSpPr>
+          <p:cNvPr id="2" name="TextBox 1"/>
+          <p:cNvSpPr txBox="1"/>
+          <p:nvPr/>
+        </p:nvSpPr>
+        <p:spPr>
+          <a:xfrm>
+            <a:off x="914400" y="914400"/>
+            <a:ext cx="914400" cy="914400"/>
+          </a:xfrm>
+          <a:prstGeom prst="rect">
+            <a:avLst/>
+          </a:prstGeom>
+          <a:noFill/>
+        </p:spPr>
+        <p:txBody>
+          <a:bodyPr wrap="none">
+            <a:spAutoFit/>
+          </a:bodyPr>
+          <a:lstStyle/>
+          <a:p>
+            <a:r>
+              <a:t>Python Code: </a:t>
+            </a:r>
+          </a:p>
+          <a:p>
+            <a:pPr>
+              <a:defRPr sz="1200"/>
+            </a:pPr>
+            <a:r>
+              <a:t>``` # Laten we proberen de eerste letter te veranderen in 'x'</a:t>
+            </a:r>
+            <a:br/>
+            <a:r>
+              <a:t> `````` s[0] = 'x' ```</a:t>
+            </a:r>
+            <a:br/>
+          </a:p>
+        </p:txBody>
+      </p:sp>
+    </p:spTree>
+  </p:cSld>
+  <p:clrMapOvr>
+    <a:masterClrMapping/>
+  </p:clrMapOvr>
+</p:sld>
+</file>
+
+<file path=ppt/slides/slide304.xml><?xml version="1.0" encoding="utf-8"?>
+<p:sld xmlns:a="http://schemas.openxmlformats.org/drawingml/2006/main" xmlns:p="http://schemas.openxmlformats.org/presentationml/2006/main" xmlns:r="http://schemas.openxmlformats.org/officeDocument/2006/relationships">
+  <p:cSld>
+    <p:spTree>
+      <p:nvGrpSpPr>
+        <p:cNvPr id="1" name=""/>
+        <p:cNvGrpSpPr/>
+        <p:nvPr/>
+      </p:nvGrpSpPr>
+      <p:grpSpPr/>
+      <p:sp>
+        <p:nvSpPr>
+          <p:cNvPr id="2" name="TextBox 1"/>
+          <p:cNvSpPr txBox="1"/>
+          <p:nvPr/>
+        </p:nvSpPr>
+        <p:spPr>
+          <a:xfrm>
+            <a:off x="914400" y="914400"/>
+            <a:ext cx="914400" cy="914400"/>
+          </a:xfrm>
+          <a:prstGeom prst="rect">
+            <a:avLst/>
+          </a:prstGeom>
+          <a:noFill/>
+        </p:spPr>
+        <p:txBody>
+          <a:bodyPr wrap="none">
+            <a:spAutoFit/>
+          </a:bodyPr>
+          <a:lstStyle/>
+          <a:p>
+            <a:r>
+              <a:t>Info:</a:t>
+            </a:r>
+          </a:p>
+          <a:p>
+            <a:pPr>
+              <a:defRPr sz="1200"/>
+            </a:pPr>
+            <a:r>
+              <a:t>Merk op hoe de fout ons direct vertelt wat we niet kunnen doen, verander de itemtoewijzing!</a:t>
+            </a:r>
+            <a:br/>
+            <a:br/>
+            <a:r>
+              <a:t>Iets wat we *kunnen* doen, is strings samenvoegen!</a:t>
+            </a:r>
+            <a:br/>
+          </a:p>
+        </p:txBody>
+      </p:sp>
+    </p:spTree>
+  </p:cSld>
+  <p:clrMapOvr>
+    <a:masterClrMapping/>
+  </p:clrMapOvr>
+</p:sld>
+</file>
+
+<file path=ppt/slides/slide305.xml><?xml version="1.0" encoding="utf-8"?>
+<p:sld xmlns:a="http://schemas.openxmlformats.org/drawingml/2006/main" xmlns:p="http://schemas.openxmlformats.org/presentationml/2006/main" xmlns:r="http://schemas.openxmlformats.org/officeDocument/2006/relationships">
+  <p:cSld>
+    <p:spTree>
+      <p:nvGrpSpPr>
+        <p:cNvPr id="1" name=""/>
+        <p:cNvGrpSpPr/>
+        <p:nvPr/>
+      </p:nvGrpSpPr>
+      <p:grpSpPr/>
+      <p:sp>
+        <p:nvSpPr>
+          <p:cNvPr id="2" name="TextBox 1"/>
+          <p:cNvSpPr txBox="1"/>
+          <p:nvPr/>
+        </p:nvSpPr>
+        <p:spPr>
+          <a:xfrm>
+            <a:off x="914400" y="914400"/>
+            <a:ext cx="914400" cy="914400"/>
+          </a:xfrm>
+          <a:prstGeom prst="rect">
+            <a:avLst/>
+          </a:prstGeom>
+          <a:noFill/>
+        </p:spPr>
+        <p:txBody>
+          <a:bodyPr wrap="none">
+            <a:spAutoFit/>
+          </a:bodyPr>
+          <a:lstStyle/>
+          <a:p>
+            <a:r>
+              <a:t>Python Code: </a:t>
+            </a:r>
+          </a:p>
+          <a:p>
+            <a:pPr>
+              <a:defRPr sz="1200"/>
+            </a:pPr>
+            <a:r>
+              <a:t>``` s ```</a:t>
+            </a:r>
+            <a:br/>
+          </a:p>
+        </p:txBody>
+      </p:sp>
+    </p:spTree>
+  </p:cSld>
+  <p:clrMapOvr>
+    <a:masterClrMapping/>
+  </p:clrMapOvr>
+</p:sld>
+</file>
+
+<file path=ppt/slides/slide306.xml><?xml version="1.0" encoding="utf-8"?>
+<p:sld xmlns:a="http://schemas.openxmlformats.org/drawingml/2006/main" xmlns:p="http://schemas.openxmlformats.org/presentationml/2006/main" xmlns:r="http://schemas.openxmlformats.org/officeDocument/2006/relationships">
+  <p:cSld>
+    <p:spTree>
+      <p:nvGrpSpPr>
+        <p:cNvPr id="1" name=""/>
+        <p:cNvGrpSpPr/>
+        <p:nvPr/>
+      </p:nvGrpSpPr>
+      <p:grpSpPr/>
+      <p:sp>
+        <p:nvSpPr>
+          <p:cNvPr id="2" name="TextBox 1"/>
+          <p:cNvSpPr txBox="1"/>
+          <p:nvPr/>
+        </p:nvSpPr>
+        <p:spPr>
+          <a:xfrm>
+            <a:off x="914400" y="914400"/>
+            <a:ext cx="914400" cy="914400"/>
+          </a:xfrm>
+          <a:prstGeom prst="rect">
+            <a:avLst/>
+          </a:prstGeom>
+          <a:noFill/>
+        </p:spPr>
+        <p:txBody>
+          <a:bodyPr wrap="none">
+            <a:spAutoFit/>
+          </a:bodyPr>
+          <a:lstStyle/>
+          <a:p>
+            <a:r>
+              <a:t>Python Code: </a:t>
+            </a:r>
+          </a:p>
+          <a:p>
+            <a:pPr>
+              <a:defRPr sz="1200"/>
+            </a:pPr>
+            <a:r>
+              <a:t>``` # Voeg strings samen!</a:t>
+            </a:r>
+            <a:br/>
+            <a:r>
+              <a:t> `````` s + ' concatenate me!' ```</a:t>
+            </a:r>
+            <a:br/>
+          </a:p>
+        </p:txBody>
+      </p:sp>
+    </p:spTree>
+  </p:cSld>
+  <p:clrMapOvr>
+    <a:masterClrMapping/>
+  </p:clrMapOvr>
+</p:sld>
+</file>
+
+<file path=ppt/slides/slide307.xml><?xml version="1.0" encoding="utf-8"?>
+<p:sld xmlns:a="http://schemas.openxmlformats.org/drawingml/2006/main" xmlns:p="http://schemas.openxmlformats.org/presentationml/2006/main" xmlns:r="http://schemas.openxmlformats.org/officeDocument/2006/relationships">
+  <p:cSld>
+    <p:spTree>
+      <p:nvGrpSpPr>
+        <p:cNvPr id="1" name=""/>
+        <p:cNvGrpSpPr/>
+        <p:nvPr/>
+      </p:nvGrpSpPr>
+      <p:grpSpPr/>
+      <p:sp>
+        <p:nvSpPr>
+          <p:cNvPr id="2" name="TextBox 1"/>
+          <p:cNvSpPr txBox="1"/>
+          <p:nvPr/>
+        </p:nvSpPr>
+        <p:spPr>
+          <a:xfrm>
+            <a:off x="914400" y="914400"/>
+            <a:ext cx="914400" cy="914400"/>
+          </a:xfrm>
+          <a:prstGeom prst="rect">
+            <a:avLst/>
+          </a:prstGeom>
+          <a:noFill/>
+        </p:spPr>
+        <p:txBody>
+          <a:bodyPr wrap="none">
+            <a:spAutoFit/>
+          </a:bodyPr>
+          <a:lstStyle/>
+          <a:p>
+            <a:r>
+              <a:t>Python Code: </a:t>
+            </a:r>
+          </a:p>
+          <a:p>
+            <a:pPr>
+              <a:defRPr sz="1200"/>
+            </a:pPr>
+            <a:r>
+              <a:t>``` # We kunnen s echter volledig opnieuw toewijzen!</a:t>
+            </a:r>
+            <a:br/>
+            <a:r>
+              <a:t> `````` s = s + ' concatenate me!' ```</a:t>
+            </a:r>
+            <a:br/>
+          </a:p>
+        </p:txBody>
+      </p:sp>
+    </p:spTree>
+  </p:cSld>
+  <p:clrMapOvr>
+    <a:masterClrMapping/>
+  </p:clrMapOvr>
+</p:sld>
+</file>
+
+<file path=ppt/slides/slide308.xml><?xml version="1.0" encoding="utf-8"?>
+<p:sld xmlns:a="http://schemas.openxmlformats.org/drawingml/2006/main" xmlns:p="http://schemas.openxmlformats.org/presentationml/2006/main" xmlns:r="http://schemas.openxmlformats.org/officeDocument/2006/relationships">
+  <p:cSld>
+    <p:spTree>
+      <p:nvGrpSpPr>
+        <p:cNvPr id="1" name=""/>
+        <p:cNvGrpSpPr/>
+        <p:nvPr/>
+      </p:nvGrpSpPr>
+      <p:grpSpPr/>
+      <p:sp>
+        <p:nvSpPr>
+          <p:cNvPr id="2" name="TextBox 1"/>
+          <p:cNvSpPr txBox="1"/>
+          <p:nvPr/>
+        </p:nvSpPr>
+        <p:spPr>
+          <a:xfrm>
+            <a:off x="914400" y="914400"/>
+            <a:ext cx="914400" cy="914400"/>
+          </a:xfrm>
+          <a:prstGeom prst="rect">
+            <a:avLst/>
+          </a:prstGeom>
+          <a:noFill/>
+        </p:spPr>
+        <p:txBody>
+          <a:bodyPr wrap="none">
+            <a:spAutoFit/>
+          </a:bodyPr>
+          <a:lstStyle/>
+          <a:p>
+            <a:r>
+              <a:t>Python Code: </a:t>
+            </a:r>
+          </a:p>
+          <a:p>
+            <a:pPr>
+              <a:defRPr sz="1200"/>
+            </a:pPr>
+            <a:r>
+              <a:t>``` print(s) ```</a:t>
+            </a:r>
+            <a:br/>
+          </a:p>
+        </p:txBody>
+      </p:sp>
+    </p:spTree>
+  </p:cSld>
+  <p:clrMapOvr>
+    <a:masterClrMapping/>
+  </p:clrMapOvr>
+</p:sld>
+</file>
+
+<file path=ppt/slides/slide309.xml><?xml version="1.0" encoding="utf-8"?>
+<p:sld xmlns:a="http://schemas.openxmlformats.org/drawingml/2006/main" xmlns:p="http://schemas.openxmlformats.org/presentationml/2006/main" xmlns:r="http://schemas.openxmlformats.org/officeDocument/2006/relationships">
+  <p:cSld>
+    <p:spTree>
+      <p:nvGrpSpPr>
+        <p:cNvPr id="1" name=""/>
+        <p:cNvGrpSpPr/>
+        <p:nvPr/>
+      </p:nvGrpSpPr>
+      <p:grpSpPr/>
+      <p:sp>
+        <p:nvSpPr>
+          <p:cNvPr id="2" name="TextBox 1"/>
+          <p:cNvSpPr txBox="1"/>
+          <p:nvPr/>
+        </p:nvSpPr>
+        <p:spPr>
+          <a:xfrm>
+            <a:off x="914400" y="914400"/>
+            <a:ext cx="914400" cy="914400"/>
+          </a:xfrm>
+          <a:prstGeom prst="rect">
+            <a:avLst/>
+          </a:prstGeom>
+          <a:noFill/>
+        </p:spPr>
+        <p:txBody>
+          <a:bodyPr wrap="none">
+            <a:spAutoFit/>
+          </a:bodyPr>
+          <a:lstStyle/>
+          <a:p>
+            <a:r>
+              <a:t>Python Code: </a:t>
+            </a:r>
+          </a:p>
+          <a:p>
+            <a:pPr>
+              <a:defRPr sz="1200"/>
+            </a:pPr>
+            <a:r>
+              <a:t>``` s ```</a:t>
+            </a:r>
+            <a:br/>
+          </a:p>
+        </p:txBody>
+      </p:sp>
+    </p:spTree>
+  </p:cSld>
+  <p:clrMapOvr>
+    <a:masterClrMapping/>
+  </p:clrMapOvr>
+</p:sld>
+</file>
+
 <file path=ppt/slides/slide31.xml><?xml version="1.0" encoding="utf-8"?>
 <p:sld xmlns:a="http://schemas.openxmlformats.org/drawingml/2006/main" xmlns:p="http://schemas.openxmlformats.org/presentationml/2006/main" xmlns:r="http://schemas.openxmlformats.org/officeDocument/2006/relationships">
   <p:cSld>
@@ -15026,6 +18048,597 @@
 </p:sld>
 </file>
 
+<file path=ppt/slides/slide310.xml><?xml version="1.0" encoding="utf-8"?>
+<p:sld xmlns:a="http://schemas.openxmlformats.org/drawingml/2006/main" xmlns:p="http://schemas.openxmlformats.org/presentationml/2006/main" xmlns:r="http://schemas.openxmlformats.org/officeDocument/2006/relationships">
+  <p:cSld>
+    <p:spTree>
+      <p:nvGrpSpPr>
+        <p:cNvPr id="1" name=""/>
+        <p:cNvGrpSpPr/>
+        <p:nvPr/>
+      </p:nvGrpSpPr>
+      <p:grpSpPr/>
+      <p:sp>
+        <p:nvSpPr>
+          <p:cNvPr id="2" name="TextBox 1"/>
+          <p:cNvSpPr txBox="1"/>
+          <p:nvPr/>
+        </p:nvSpPr>
+        <p:spPr>
+          <a:xfrm>
+            <a:off x="914400" y="914400"/>
+            <a:ext cx="914400" cy="914400"/>
+          </a:xfrm>
+          <a:prstGeom prst="rect">
+            <a:avLst/>
+          </a:prstGeom>
+          <a:noFill/>
+        </p:spPr>
+        <p:txBody>
+          <a:bodyPr wrap="none">
+            <a:spAutoFit/>
+          </a:bodyPr>
+          <a:lstStyle/>
+          <a:p>
+            <a:r>
+              <a:t>Info:</a:t>
+            </a:r>
+          </a:p>
+          <a:p>
+            <a:pPr>
+              <a:defRPr sz="1200"/>
+            </a:pPr>
+            <a:r>
+              <a:t>We kunnen het vermenigvuldigingssymbool gebruiken om herhaling te creëren!</a:t>
+            </a:r>
+            <a:br/>
+          </a:p>
+        </p:txBody>
+      </p:sp>
+    </p:spTree>
+  </p:cSld>
+  <p:clrMapOvr>
+    <a:masterClrMapping/>
+  </p:clrMapOvr>
+</p:sld>
+</file>
+
+<file path=ppt/slides/slide311.xml><?xml version="1.0" encoding="utf-8"?>
+<p:sld xmlns:a="http://schemas.openxmlformats.org/drawingml/2006/main" xmlns:p="http://schemas.openxmlformats.org/presentationml/2006/main" xmlns:r="http://schemas.openxmlformats.org/officeDocument/2006/relationships">
+  <p:cSld>
+    <p:spTree>
+      <p:nvGrpSpPr>
+        <p:cNvPr id="1" name=""/>
+        <p:cNvGrpSpPr/>
+        <p:nvPr/>
+      </p:nvGrpSpPr>
+      <p:grpSpPr/>
+      <p:sp>
+        <p:nvSpPr>
+          <p:cNvPr id="2" name="TextBox 1"/>
+          <p:cNvSpPr txBox="1"/>
+          <p:nvPr/>
+        </p:nvSpPr>
+        <p:spPr>
+          <a:xfrm>
+            <a:off x="914400" y="914400"/>
+            <a:ext cx="914400" cy="914400"/>
+          </a:xfrm>
+          <a:prstGeom prst="rect">
+            <a:avLst/>
+          </a:prstGeom>
+          <a:noFill/>
+        </p:spPr>
+        <p:txBody>
+          <a:bodyPr wrap="none">
+            <a:spAutoFit/>
+          </a:bodyPr>
+          <a:lstStyle/>
+          <a:p>
+            <a:r>
+              <a:t>Python Code: </a:t>
+            </a:r>
+          </a:p>
+          <a:p>
+            <a:pPr>
+              <a:defRPr sz="1200"/>
+            </a:pPr>
+            <a:r>
+              <a:t>``` letter = 'z' ```</a:t>
+            </a:r>
+            <a:br/>
+          </a:p>
+        </p:txBody>
+      </p:sp>
+    </p:spTree>
+  </p:cSld>
+  <p:clrMapOvr>
+    <a:masterClrMapping/>
+  </p:clrMapOvr>
+</p:sld>
+</file>
+
+<file path=ppt/slides/slide312.xml><?xml version="1.0" encoding="utf-8"?>
+<p:sld xmlns:a="http://schemas.openxmlformats.org/drawingml/2006/main" xmlns:p="http://schemas.openxmlformats.org/presentationml/2006/main" xmlns:r="http://schemas.openxmlformats.org/officeDocument/2006/relationships">
+  <p:cSld>
+    <p:spTree>
+      <p:nvGrpSpPr>
+        <p:cNvPr id="1" name=""/>
+        <p:cNvGrpSpPr/>
+        <p:nvPr/>
+      </p:nvGrpSpPr>
+      <p:grpSpPr/>
+      <p:sp>
+        <p:nvSpPr>
+          <p:cNvPr id="2" name="TextBox 1"/>
+          <p:cNvSpPr txBox="1"/>
+          <p:nvPr/>
+        </p:nvSpPr>
+        <p:spPr>
+          <a:xfrm>
+            <a:off x="914400" y="914400"/>
+            <a:ext cx="914400" cy="914400"/>
+          </a:xfrm>
+          <a:prstGeom prst="rect">
+            <a:avLst/>
+          </a:prstGeom>
+          <a:noFill/>
+        </p:spPr>
+        <p:txBody>
+          <a:bodyPr wrap="none">
+            <a:spAutoFit/>
+          </a:bodyPr>
+          <a:lstStyle/>
+          <a:p>
+            <a:r>
+              <a:t>Python Code: </a:t>
+            </a:r>
+          </a:p>
+          <a:p>
+            <a:pPr>
+              <a:defRPr sz="1200"/>
+            </a:pPr>
+            <a:r>
+              <a:t>``` letter*10 ```</a:t>
+            </a:r>
+            <a:br/>
+          </a:p>
+        </p:txBody>
+      </p:sp>
+    </p:spTree>
+  </p:cSld>
+  <p:clrMapOvr>
+    <a:masterClrMapping/>
+  </p:clrMapOvr>
+</p:sld>
+</file>
+
+<file path=ppt/slides/slide313.xml><?xml version="1.0" encoding="utf-8"?>
+<p:sld xmlns:a="http://schemas.openxmlformats.org/drawingml/2006/main" xmlns:p="http://schemas.openxmlformats.org/presentationml/2006/main" xmlns:r="http://schemas.openxmlformats.org/officeDocument/2006/relationships">
+  <p:cSld>
+    <p:spTree>
+      <p:nvGrpSpPr>
+        <p:cNvPr id="1" name=""/>
+        <p:cNvGrpSpPr/>
+        <p:nvPr/>
+      </p:nvGrpSpPr>
+      <p:grpSpPr/>
+      <p:sp>
+        <p:nvSpPr>
+          <p:cNvPr id="2" name="TextBox 1"/>
+          <p:cNvSpPr txBox="1"/>
+          <p:nvPr/>
+        </p:nvSpPr>
+        <p:spPr>
+          <a:xfrm>
+            <a:off x="914400" y="914400"/>
+            <a:ext cx="914400" cy="914400"/>
+          </a:xfrm>
+          <a:prstGeom prst="rect">
+            <a:avLst/>
+          </a:prstGeom>
+          <a:noFill/>
+        </p:spPr>
+        <p:txBody>
+          <a:bodyPr wrap="none">
+            <a:spAutoFit/>
+          </a:bodyPr>
+          <a:lstStyle/>
+          <a:p>
+            <a:r>
+              <a:t>Info:</a:t>
+            </a:r>
+          </a:p>
+          <a:p>
+            <a:pPr>
+              <a:defRPr sz="1200"/>
+            </a:pPr>
+            <a:r>
+              <a:t>## Basis Ingebouwde String-methoden</a:t>
+            </a:r>
+            <a:br/>
+            <a:br/>
+            <a:r>
+              <a:t>Objecten in Python hebben meestal ingebouwde methoden. Deze methoden zijn functies binnen het object (we zullen hier later veel dieper op ingaan) die acties of opdrachten op het object zelf kunnen uitvoeren.</a:t>
+            </a:r>
+            <a:br/>
+            <a:br/>
+            <a:r>
+              <a:t>We noemen methoden met een punt en dan de naam van de methode. Methoden zijn in de vorm:</a:t>
+            </a:r>
+            <a:br/>
+            <a:br/>
+            <a:r>
+              <a:t>object.methode(parameters)</a:t>
+            </a:r>
+            <a:br/>
+            <a:br/>
+            <a:r>
+              <a:t>Waar parameters extra argumenten zijn, kunnen we doorgeven aan de methode. Maak je geen zorgen als de details op dit moment niet 100% kloppen. Later gaan we onze eigen objecten en functies maken!</a:t>
+            </a:r>
+            <a:br/>
+            <a:br/>
+            <a:r>
+              <a:t>Hier zijn enkele voorbeelden van ingebouwde methoden in strings:</a:t>
+            </a:r>
+            <a:br/>
+          </a:p>
+        </p:txBody>
+      </p:sp>
+    </p:spTree>
+  </p:cSld>
+  <p:clrMapOvr>
+    <a:masterClrMapping/>
+  </p:clrMapOvr>
+</p:sld>
+</file>
+
+<file path=ppt/slides/slide314.xml><?xml version="1.0" encoding="utf-8"?>
+<p:sld xmlns:a="http://schemas.openxmlformats.org/drawingml/2006/main" xmlns:p="http://schemas.openxmlformats.org/presentationml/2006/main" xmlns:r="http://schemas.openxmlformats.org/officeDocument/2006/relationships">
+  <p:cSld>
+    <p:spTree>
+      <p:nvGrpSpPr>
+        <p:cNvPr id="1" name=""/>
+        <p:cNvGrpSpPr/>
+        <p:nvPr/>
+      </p:nvGrpSpPr>
+      <p:grpSpPr/>
+      <p:sp>
+        <p:nvSpPr>
+          <p:cNvPr id="2" name="TextBox 1"/>
+          <p:cNvSpPr txBox="1"/>
+          <p:nvPr/>
+        </p:nvSpPr>
+        <p:spPr>
+          <a:xfrm>
+            <a:off x="914400" y="914400"/>
+            <a:ext cx="914400" cy="914400"/>
+          </a:xfrm>
+          <a:prstGeom prst="rect">
+            <a:avLst/>
+          </a:prstGeom>
+          <a:noFill/>
+        </p:spPr>
+        <p:txBody>
+          <a:bodyPr wrap="none">
+            <a:spAutoFit/>
+          </a:bodyPr>
+          <a:lstStyle/>
+          <a:p>
+            <a:r>
+              <a:t>Python Code: </a:t>
+            </a:r>
+          </a:p>
+          <a:p>
+            <a:pPr>
+              <a:defRPr sz="1200"/>
+            </a:pPr>
+            <a:r>
+              <a:t>``` s ```</a:t>
+            </a:r>
+            <a:br/>
+          </a:p>
+        </p:txBody>
+      </p:sp>
+    </p:spTree>
+  </p:cSld>
+  <p:clrMapOvr>
+    <a:masterClrMapping/>
+  </p:clrMapOvr>
+</p:sld>
+</file>
+
+<file path=ppt/slides/slide315.xml><?xml version="1.0" encoding="utf-8"?>
+<p:sld xmlns:a="http://schemas.openxmlformats.org/drawingml/2006/main" xmlns:p="http://schemas.openxmlformats.org/presentationml/2006/main" xmlns:r="http://schemas.openxmlformats.org/officeDocument/2006/relationships">
+  <p:cSld>
+    <p:spTree>
+      <p:nvGrpSpPr>
+        <p:cNvPr id="1" name=""/>
+        <p:cNvGrpSpPr/>
+        <p:nvPr/>
+      </p:nvGrpSpPr>
+      <p:grpSpPr/>
+      <p:sp>
+        <p:nvSpPr>
+          <p:cNvPr id="2" name="TextBox 1"/>
+          <p:cNvSpPr txBox="1"/>
+          <p:nvPr/>
+        </p:nvSpPr>
+        <p:spPr>
+          <a:xfrm>
+            <a:off x="914400" y="914400"/>
+            <a:ext cx="914400" cy="914400"/>
+          </a:xfrm>
+          <a:prstGeom prst="rect">
+            <a:avLst/>
+          </a:prstGeom>
+          <a:noFill/>
+        </p:spPr>
+        <p:txBody>
+          <a:bodyPr wrap="none">
+            <a:spAutoFit/>
+          </a:bodyPr>
+          <a:lstStyle/>
+          <a:p>
+            <a:r>
+              <a:t>Python Code: </a:t>
+            </a:r>
+          </a:p>
+          <a:p>
+            <a:pPr>
+              <a:defRPr sz="1200"/>
+            </a:pPr>
+            <a:r>
+              <a:t>``` # Hoofdletters een string</a:t>
+            </a:r>
+            <a:br/>
+            <a:r>
+              <a:t> `````` s.upper() ```</a:t>
+            </a:r>
+            <a:br/>
+          </a:p>
+        </p:txBody>
+      </p:sp>
+    </p:spTree>
+  </p:cSld>
+  <p:clrMapOvr>
+    <a:masterClrMapping/>
+  </p:clrMapOvr>
+</p:sld>
+</file>
+
+<file path=ppt/slides/slide316.xml><?xml version="1.0" encoding="utf-8"?>
+<p:sld xmlns:a="http://schemas.openxmlformats.org/drawingml/2006/main" xmlns:p="http://schemas.openxmlformats.org/presentationml/2006/main" xmlns:r="http://schemas.openxmlformats.org/officeDocument/2006/relationships">
+  <p:cSld>
+    <p:spTree>
+      <p:nvGrpSpPr>
+        <p:cNvPr id="1" name=""/>
+        <p:cNvGrpSpPr/>
+        <p:nvPr/>
+      </p:nvGrpSpPr>
+      <p:grpSpPr/>
+      <p:sp>
+        <p:nvSpPr>
+          <p:cNvPr id="2" name="TextBox 1"/>
+          <p:cNvSpPr txBox="1"/>
+          <p:nvPr/>
+        </p:nvSpPr>
+        <p:spPr>
+          <a:xfrm>
+            <a:off x="914400" y="914400"/>
+            <a:ext cx="914400" cy="914400"/>
+          </a:xfrm>
+          <a:prstGeom prst="rect">
+            <a:avLst/>
+          </a:prstGeom>
+          <a:noFill/>
+        </p:spPr>
+        <p:txBody>
+          <a:bodyPr wrap="none">
+            <a:spAutoFit/>
+          </a:bodyPr>
+          <a:lstStyle/>
+          <a:p>
+            <a:r>
+              <a:t>Python Code: </a:t>
+            </a:r>
+          </a:p>
+          <a:p>
+            <a:pPr>
+              <a:defRPr sz="1200"/>
+            </a:pPr>
+            <a:r>
+              <a:t>``` # Kleine letters</a:t>
+            </a:r>
+            <a:br/>
+            <a:r>
+              <a:t> `````` s.lower() ```</a:t>
+            </a:r>
+            <a:br/>
+          </a:p>
+        </p:txBody>
+      </p:sp>
+    </p:spTree>
+  </p:cSld>
+  <p:clrMapOvr>
+    <a:masterClrMapping/>
+  </p:clrMapOvr>
+</p:sld>
+</file>
+
+<file path=ppt/slides/slide317.xml><?xml version="1.0" encoding="utf-8"?>
+<p:sld xmlns:a="http://schemas.openxmlformats.org/drawingml/2006/main" xmlns:p="http://schemas.openxmlformats.org/presentationml/2006/main" xmlns:r="http://schemas.openxmlformats.org/officeDocument/2006/relationships">
+  <p:cSld>
+    <p:spTree>
+      <p:nvGrpSpPr>
+        <p:cNvPr id="1" name=""/>
+        <p:cNvGrpSpPr/>
+        <p:nvPr/>
+      </p:nvGrpSpPr>
+      <p:grpSpPr/>
+      <p:sp>
+        <p:nvSpPr>
+          <p:cNvPr id="2" name="TextBox 1"/>
+          <p:cNvSpPr txBox="1"/>
+          <p:nvPr/>
+        </p:nvSpPr>
+        <p:spPr>
+          <a:xfrm>
+            <a:off x="914400" y="914400"/>
+            <a:ext cx="914400" cy="914400"/>
+          </a:xfrm>
+          <a:prstGeom prst="rect">
+            <a:avLst/>
+          </a:prstGeom>
+          <a:noFill/>
+        </p:spPr>
+        <p:txBody>
+          <a:bodyPr wrap="none">
+            <a:spAutoFit/>
+          </a:bodyPr>
+          <a:lstStyle/>
+          <a:p>
+            <a:r>
+              <a:t>Python Code: </a:t>
+            </a:r>
+          </a:p>
+          <a:p>
+            <a:pPr>
+              <a:defRPr sz="1200"/>
+            </a:pPr>
+            <a:r>
+              <a:t>``` # Splits een string door spatie (dit is de standaard)</a:t>
+            </a:r>
+            <a:br/>
+            <a:r>
+              <a:t> `````` s.split() ```</a:t>
+            </a:r>
+            <a:br/>
+          </a:p>
+        </p:txBody>
+      </p:sp>
+    </p:spTree>
+  </p:cSld>
+  <p:clrMapOvr>
+    <a:masterClrMapping/>
+  </p:clrMapOvr>
+</p:sld>
+</file>
+
+<file path=ppt/slides/slide318.xml><?xml version="1.0" encoding="utf-8"?>
+<p:sld xmlns:a="http://schemas.openxmlformats.org/drawingml/2006/main" xmlns:p="http://schemas.openxmlformats.org/presentationml/2006/main" xmlns:r="http://schemas.openxmlformats.org/officeDocument/2006/relationships">
+  <p:cSld>
+    <p:spTree>
+      <p:nvGrpSpPr>
+        <p:cNvPr id="1" name=""/>
+        <p:cNvGrpSpPr/>
+        <p:nvPr/>
+      </p:nvGrpSpPr>
+      <p:grpSpPr/>
+      <p:sp>
+        <p:nvSpPr>
+          <p:cNvPr id="2" name="TextBox 1"/>
+          <p:cNvSpPr txBox="1"/>
+          <p:nvPr/>
+        </p:nvSpPr>
+        <p:spPr>
+          <a:xfrm>
+            <a:off x="914400" y="914400"/>
+            <a:ext cx="914400" cy="914400"/>
+          </a:xfrm>
+          <a:prstGeom prst="rect">
+            <a:avLst/>
+          </a:prstGeom>
+          <a:noFill/>
+        </p:spPr>
+        <p:txBody>
+          <a:bodyPr wrap="none">
+            <a:spAutoFit/>
+          </a:bodyPr>
+          <a:lstStyle/>
+          <a:p>
+            <a:r>
+              <a:t>Python Code: </a:t>
+            </a:r>
+          </a:p>
+          <a:p>
+            <a:pPr>
+              <a:defRPr sz="1200"/>
+            </a:pPr>
+            <a:r>
+              <a:t>``` # Gesplitst door een specifiek element (omvat niet het element waarop is gesplitst)</a:t>
+            </a:r>
+            <a:br/>
+            <a:r>
+              <a:t> `````` s.split('W') ```</a:t>
+            </a:r>
+            <a:br/>
+          </a:p>
+        </p:txBody>
+      </p:sp>
+    </p:spTree>
+  </p:cSld>
+  <p:clrMapOvr>
+    <a:masterClrMapping/>
+  </p:clrMapOvr>
+</p:sld>
+</file>
+
+<file path=ppt/slides/slide319.xml><?xml version="1.0" encoding="utf-8"?>
+<p:sld xmlns:a="http://schemas.openxmlformats.org/drawingml/2006/main" xmlns:p="http://schemas.openxmlformats.org/presentationml/2006/main" xmlns:r="http://schemas.openxmlformats.org/officeDocument/2006/relationships">
+  <p:cSld>
+    <p:spTree>
+      <p:nvGrpSpPr>
+        <p:cNvPr id="1" name=""/>
+        <p:cNvGrpSpPr/>
+        <p:nvPr/>
+      </p:nvGrpSpPr>
+      <p:grpSpPr/>
+      <p:sp>
+        <p:nvSpPr>
+          <p:cNvPr id="2" name="TextBox 1"/>
+          <p:cNvSpPr txBox="1"/>
+          <p:nvPr/>
+        </p:nvSpPr>
+        <p:spPr>
+          <a:xfrm>
+            <a:off x="914400" y="914400"/>
+            <a:ext cx="914400" cy="914400"/>
+          </a:xfrm>
+          <a:prstGeom prst="rect">
+            <a:avLst/>
+          </a:prstGeom>
+          <a:noFill/>
+        </p:spPr>
+        <p:txBody>
+          <a:bodyPr wrap="none">
+            <a:spAutoFit/>
+          </a:bodyPr>
+          <a:lstStyle/>
+          <a:p>
+            <a:r>
+              <a:t>Info:</a:t>
+            </a:r>
+          </a:p>
+          <a:p>
+            <a:pPr>
+              <a:defRPr sz="1200"/>
+            </a:pPr>
+            <a:r>
+              <a:t>Er zijn veel meer methoden dan degene die hier worden behandeld. Bezoek de Advanced String sectie voor meer informatie!</a:t>
+            </a:r>
+            <a:br/>
+          </a:p>
+        </p:txBody>
+      </p:sp>
+    </p:spTree>
+  </p:cSld>
+  <p:clrMapOvr>
+    <a:masterClrMapping/>
+  </p:clrMapOvr>
+</p:sld>
+</file>
+
 <file path=ppt/slides/slide32.xml><?xml version="1.0" encoding="utf-8"?>
 <p:sld xmlns:a="http://schemas.openxmlformats.org/drawingml/2006/main" xmlns:p="http://schemas.openxmlformats.org/presentationml/2006/main" xmlns:r="http://schemas.openxmlformats.org/officeDocument/2006/relationships">
   <p:cSld>
@@ -15082,6 +18695,236 @@
             </a:r>
           </a:p>
           <a:p/>
+        </p:txBody>
+      </p:sp>
+    </p:spTree>
+  </p:cSld>
+  <p:clrMapOvr>
+    <a:masterClrMapping/>
+  </p:clrMapOvr>
+</p:sld>
+</file>
+
+<file path=ppt/slides/slide320.xml><?xml version="1.0" encoding="utf-8"?>
+<p:sld xmlns:a="http://schemas.openxmlformats.org/drawingml/2006/main" xmlns:p="http://schemas.openxmlformats.org/presentationml/2006/main" xmlns:r="http://schemas.openxmlformats.org/officeDocument/2006/relationships">
+  <p:cSld>
+    <p:spTree>
+      <p:nvGrpSpPr>
+        <p:cNvPr id="1" name=""/>
+        <p:cNvGrpSpPr/>
+        <p:nvPr/>
+      </p:nvGrpSpPr>
+      <p:grpSpPr/>
+      <p:sp>
+        <p:nvSpPr>
+          <p:cNvPr id="2" name="TextBox 1"/>
+          <p:cNvSpPr txBox="1"/>
+          <p:nvPr/>
+        </p:nvSpPr>
+        <p:spPr>
+          <a:xfrm>
+            <a:off x="914400" y="914400"/>
+            <a:ext cx="914400" cy="914400"/>
+          </a:xfrm>
+          <a:prstGeom prst="rect">
+            <a:avLst/>
+          </a:prstGeom>
+          <a:noFill/>
+        </p:spPr>
+        <p:txBody>
+          <a:bodyPr wrap="none">
+            <a:spAutoFit/>
+          </a:bodyPr>
+          <a:lstStyle/>
+          <a:p>
+            <a:r>
+              <a:t>Info:</a:t>
+            </a:r>
+          </a:p>
+          <a:p>
+            <a:pPr>
+              <a:defRPr sz="1200"/>
+            </a:pPr>
+            <a:r>
+              <a:t>## Formattering van de afdrukken</a:t>
+            </a:r>
+            <a:br/>
+            <a:br/>
+            <a:r>
+              <a:t>We kunnen de methode .format() gebruiken om opgemaakte objecten toe te voegen aan afgedrukte String-instructies.</a:t>
+            </a:r>
+            <a:br/>
+            <a:br/>
+            <a:r>
+              <a:t>De eenvoudigste manier om dit aan te tonen is door middel van een voorbeeld:</a:t>
+            </a:r>
+            <a:br/>
+          </a:p>
+        </p:txBody>
+      </p:sp>
+    </p:spTree>
+  </p:cSld>
+  <p:clrMapOvr>
+    <a:masterClrMapping/>
+  </p:clrMapOvr>
+</p:sld>
+</file>
+
+<file path=ppt/slides/slide321.xml><?xml version="1.0" encoding="utf-8"?>
+<p:sld xmlns:a="http://schemas.openxmlformats.org/drawingml/2006/main" xmlns:p="http://schemas.openxmlformats.org/presentationml/2006/main" xmlns:r="http://schemas.openxmlformats.org/officeDocument/2006/relationships">
+  <p:cSld>
+    <p:spTree>
+      <p:nvGrpSpPr>
+        <p:cNvPr id="1" name=""/>
+        <p:cNvGrpSpPr/>
+        <p:nvPr/>
+      </p:nvGrpSpPr>
+      <p:grpSpPr/>
+      <p:sp>
+        <p:nvSpPr>
+          <p:cNvPr id="2" name="TextBox 1"/>
+          <p:cNvSpPr txBox="1"/>
+          <p:nvPr/>
+        </p:nvSpPr>
+        <p:spPr>
+          <a:xfrm>
+            <a:off x="914400" y="914400"/>
+            <a:ext cx="914400" cy="914400"/>
+          </a:xfrm>
+          <a:prstGeom prst="rect">
+            <a:avLst/>
+          </a:prstGeom>
+          <a:noFill/>
+        </p:spPr>
+        <p:txBody>
+          <a:bodyPr wrap="none">
+            <a:spAutoFit/>
+          </a:bodyPr>
+          <a:lstStyle/>
+          <a:p>
+            <a:r>
+              <a:t>Python Code: </a:t>
+            </a:r>
+          </a:p>
+          <a:p>
+            <a:pPr>
+              <a:defRPr sz="1200"/>
+            </a:pPr>
+            <a:r>
+              <a:t>``` 'Insert another string with curly brackets: {}'.format('The inserted string') ```</a:t>
+            </a:r>
+            <a:br/>
+          </a:p>
+        </p:txBody>
+      </p:sp>
+    </p:spTree>
+  </p:cSld>
+  <p:clrMapOvr>
+    <a:masterClrMapping/>
+  </p:clrMapOvr>
+</p:sld>
+</file>
+
+<file path=ppt/slides/slide322.xml><?xml version="1.0" encoding="utf-8"?>
+<p:sld xmlns:a="http://schemas.openxmlformats.org/drawingml/2006/main" xmlns:p="http://schemas.openxmlformats.org/presentationml/2006/main" xmlns:r="http://schemas.openxmlformats.org/officeDocument/2006/relationships">
+  <p:cSld>
+    <p:spTree>
+      <p:nvGrpSpPr>
+        <p:cNvPr id="1" name=""/>
+        <p:cNvGrpSpPr/>
+        <p:nvPr/>
+      </p:nvGrpSpPr>
+      <p:grpSpPr/>
+      <p:sp>
+        <p:nvSpPr>
+          <p:cNvPr id="2" name="TextBox 1"/>
+          <p:cNvSpPr txBox="1"/>
+          <p:nvPr/>
+        </p:nvSpPr>
+        <p:spPr>
+          <a:xfrm>
+            <a:off x="914400" y="914400"/>
+            <a:ext cx="914400" cy="914400"/>
+          </a:xfrm>
+          <a:prstGeom prst="rect">
+            <a:avLst/>
+          </a:prstGeom>
+          <a:noFill/>
+        </p:spPr>
+        <p:txBody>
+          <a:bodyPr wrap="none">
+            <a:spAutoFit/>
+          </a:bodyPr>
+          <a:lstStyle/>
+          <a:p>
+            <a:r>
+              <a:t>Info:</a:t>
+            </a:r>
+          </a:p>
+          <a:p>
+            <a:pPr>
+              <a:defRPr sz="1200"/>
+            </a:pPr>
+            <a:r>
+              <a:t>We zullen dit onderwerp voor het opmaken van strings in latere secties opnieuw bekijken wanneer we onze projecten bouwen!</a:t>
+            </a:r>
+            <a:br/>
+          </a:p>
+        </p:txBody>
+      </p:sp>
+    </p:spTree>
+  </p:cSld>
+  <p:clrMapOvr>
+    <a:masterClrMapping/>
+  </p:clrMapOvr>
+</p:sld>
+</file>
+
+<file path=ppt/slides/slide323.xml><?xml version="1.0" encoding="utf-8"?>
+<p:sld xmlns:a="http://schemas.openxmlformats.org/drawingml/2006/main" xmlns:p="http://schemas.openxmlformats.org/presentationml/2006/main" xmlns:r="http://schemas.openxmlformats.org/officeDocument/2006/relationships">
+  <p:cSld>
+    <p:spTree>
+      <p:nvGrpSpPr>
+        <p:cNvPr id="1" name=""/>
+        <p:cNvGrpSpPr/>
+        <p:nvPr/>
+      </p:nvGrpSpPr>
+      <p:grpSpPr/>
+      <p:sp>
+        <p:nvSpPr>
+          <p:cNvPr id="2" name="TextBox 1"/>
+          <p:cNvSpPr txBox="1"/>
+          <p:nvPr/>
+        </p:nvSpPr>
+        <p:spPr>
+          <a:xfrm>
+            <a:off x="914400" y="914400"/>
+            <a:ext cx="914400" cy="914400"/>
+          </a:xfrm>
+          <a:prstGeom prst="rect">
+            <a:avLst/>
+          </a:prstGeom>
+          <a:noFill/>
+        </p:spPr>
+        <p:txBody>
+          <a:bodyPr wrap="none">
+            <a:spAutoFit/>
+          </a:bodyPr>
+          <a:lstStyle/>
+          <a:p>
+            <a:r>
+              <a:t>Info:</a:t>
+            </a:r>
+          </a:p>
+          <a:p>
+            <a:pPr>
+              <a:defRPr sz="1200"/>
+            </a:pPr>
+            <a:r>
+              <a:t>## Volgende: Lijsten!</a:t>
+            </a:r>
+            <a:br/>
+          </a:p>
         </p:txBody>
       </p:sp>
     </p:spTree>

</xml_diff>